<commit_message>
added to the presentation
</commit_message>
<xml_diff>
--- a/typescript/presentation.pptx
+++ b/typescript/presentation.pptx
@@ -5,37 +5,39 @@
     <p:sldMasterId id="2147483648" r:id="rId2"/>
   </p:sldMasterIdLst>
   <p:notesMasterIdLst>
-    <p:notesMasterId r:id="rId28"/>
+    <p:notesMasterId r:id="rId30"/>
   </p:notesMasterIdLst>
   <p:handoutMasterIdLst>
-    <p:handoutMasterId r:id="rId29"/>
+    <p:handoutMasterId r:id="rId31"/>
   </p:handoutMasterIdLst>
   <p:sldIdLst>
     <p:sldId id="256" r:id="rId3"/>
     <p:sldId id="267" r:id="rId4"/>
     <p:sldId id="303" r:id="rId5"/>
     <p:sldId id="276" r:id="rId6"/>
-    <p:sldId id="283" r:id="rId7"/>
-    <p:sldId id="285" r:id="rId8"/>
-    <p:sldId id="286" r:id="rId9"/>
-    <p:sldId id="287" r:id="rId10"/>
-    <p:sldId id="274" r:id="rId11"/>
-    <p:sldId id="288" r:id="rId12"/>
-    <p:sldId id="289" r:id="rId13"/>
-    <p:sldId id="290" r:id="rId14"/>
-    <p:sldId id="291" r:id="rId15"/>
-    <p:sldId id="293" r:id="rId16"/>
-    <p:sldId id="292" r:id="rId17"/>
-    <p:sldId id="294" r:id="rId18"/>
-    <p:sldId id="299" r:id="rId19"/>
-    <p:sldId id="300" r:id="rId20"/>
-    <p:sldId id="295" r:id="rId21"/>
-    <p:sldId id="296" r:id="rId22"/>
-    <p:sldId id="297" r:id="rId23"/>
-    <p:sldId id="298" r:id="rId24"/>
-    <p:sldId id="301" r:id="rId25"/>
-    <p:sldId id="302" r:id="rId26"/>
-    <p:sldId id="304" r:id="rId27"/>
+    <p:sldId id="305" r:id="rId7"/>
+    <p:sldId id="283" r:id="rId8"/>
+    <p:sldId id="306" r:id="rId9"/>
+    <p:sldId id="285" r:id="rId10"/>
+    <p:sldId id="286" r:id="rId11"/>
+    <p:sldId id="287" r:id="rId12"/>
+    <p:sldId id="274" r:id="rId13"/>
+    <p:sldId id="288" r:id="rId14"/>
+    <p:sldId id="289" r:id="rId15"/>
+    <p:sldId id="290" r:id="rId16"/>
+    <p:sldId id="291" r:id="rId17"/>
+    <p:sldId id="293" r:id="rId18"/>
+    <p:sldId id="292" r:id="rId19"/>
+    <p:sldId id="294" r:id="rId20"/>
+    <p:sldId id="299" r:id="rId21"/>
+    <p:sldId id="300" r:id="rId22"/>
+    <p:sldId id="295" r:id="rId23"/>
+    <p:sldId id="296" r:id="rId24"/>
+    <p:sldId id="297" r:id="rId25"/>
+    <p:sldId id="298" r:id="rId26"/>
+    <p:sldId id="301" r:id="rId27"/>
+    <p:sldId id="302" r:id="rId28"/>
+    <p:sldId id="304" r:id="rId29"/>
   </p:sldIdLst>
   <p:sldSz cx="12192000" cy="6858000"/>
   <p:notesSz cx="6858000" cy="9144000"/>
@@ -4125,28 +4127,21 @@
             <p:ph type="title"/>
           </p:nvPr>
         </p:nvSpPr>
-        <p:spPr>
-          <a:xfrm>
-            <a:off x="0" y="0"/>
-            <a:ext cx="2352575" cy="651577"/>
-          </a:xfrm>
-        </p:spPr>
-        <p:txBody>
-          <a:bodyPr>
-            <a:normAutofit/>
-          </a:bodyPr>
+        <p:spPr/>
+        <p:txBody>
+          <a:bodyPr/>
           <a:lstStyle/>
           <a:p>
             <a:r>
               <a:rPr lang="en-US" dirty="0"/>
-              <a:t>Types</a:t>
+              <a:t>Who uses                          ? </a:t>
             </a:r>
           </a:p>
         </p:txBody>
       </p:sp>
       <p:pic>
         <p:nvPicPr>
-          <p:cNvPr id="4098" name="Picture 2" descr="http://puu.sh/of5rK/1bdc9bd6e3.png"/>
+          <p:cNvPr id="4" name="Picture 4" descr="https://upload.wikimedia.org/wikipedia/commons/a/a6/TypeScript_Logo.png"/>
           <p:cNvPicPr>
             <a:picLocks noChangeAspect="1" noChangeArrowheads="1"/>
           </p:cNvPicPr>
@@ -4167,8 +4162,8 @@
         </p:blipFill>
         <p:spPr bwMode="auto">
           <a:xfrm>
-            <a:off x="0" y="2021388"/>
-            <a:ext cx="4988169" cy="3075610"/>
+            <a:off x="3168411" y="1119758"/>
+            <a:ext cx="2381250" cy="581026"/>
           </a:xfrm>
           <a:prstGeom prst="rect">
             <a:avLst/>
@@ -4185,226 +4180,15 @@
           </a:extLst>
         </p:spPr>
       </p:pic>
-      <p:cxnSp>
-        <p:nvCxnSpPr>
-          <p:cNvPr id="5" name="Straight Arrow Connector 4"/>
-          <p:cNvCxnSpPr/>
-          <p:nvPr/>
-        </p:nvCxnSpPr>
-        <p:spPr>
-          <a:xfrm flipH="1">
-            <a:off x="2803360" y="1091130"/>
-            <a:ext cx="2310061" cy="1058779"/>
-          </a:xfrm>
-          <a:prstGeom prst="straightConnector1">
-            <a:avLst/>
-          </a:prstGeom>
-          <a:ln>
-            <a:tailEnd type="triangle"/>
-          </a:ln>
-        </p:spPr>
-        <p:style>
-          <a:lnRef idx="1">
-            <a:schemeClr val="accent1"/>
-          </a:lnRef>
-          <a:fillRef idx="0">
-            <a:schemeClr val="accent1"/>
-          </a:fillRef>
-          <a:effectRef idx="0">
-            <a:schemeClr val="accent1"/>
-          </a:effectRef>
-          <a:fontRef idx="minor">
-            <a:schemeClr val="tx1"/>
-          </a:fontRef>
-        </p:style>
-      </p:cxnSp>
-      <p:sp>
-        <p:nvSpPr>
-          <p:cNvPr id="8" name="TextBox 7"/>
-          <p:cNvSpPr txBox="1"/>
-          <p:nvPr/>
-        </p:nvSpPr>
-        <p:spPr>
-          <a:xfrm>
-            <a:off x="5113421" y="906464"/>
-            <a:ext cx="3796360" cy="369332"/>
-          </a:xfrm>
-          <a:prstGeom prst="rect">
-            <a:avLst/>
-          </a:prstGeom>
-          <a:noFill/>
-        </p:spPr>
-        <p:txBody>
-          <a:bodyPr wrap="none" rtlCol="0">
-            <a:spAutoFit/>
-          </a:bodyPr>
-          <a:lstStyle/>
-          <a:p>
-            <a:r>
-              <a:rPr lang="en-US" dirty="0"/>
-              <a:t>Infers type of </a:t>
-            </a:r>
-            <a:r>
-              <a:rPr lang="en-US" i="1" dirty="0" err="1"/>
-              <a:t>someNumber</a:t>
-            </a:r>
-            <a:r>
-              <a:rPr lang="en-US" dirty="0"/>
-              <a:t> as </a:t>
-            </a:r>
-            <a:r>
-              <a:rPr lang="en-US" i="1" dirty="0"/>
-              <a:t>number</a:t>
-            </a:r>
-          </a:p>
-        </p:txBody>
-      </p:sp>
-      <p:cxnSp>
-        <p:nvCxnSpPr>
-          <p:cNvPr id="12" name="Straight Arrow Connector 11"/>
-          <p:cNvCxnSpPr/>
-          <p:nvPr/>
-        </p:nvCxnSpPr>
-        <p:spPr>
-          <a:xfrm flipH="1" flipV="1">
-            <a:off x="3909647" y="2907994"/>
-            <a:ext cx="2186353" cy="172173"/>
-          </a:xfrm>
-          <a:prstGeom prst="straightConnector1">
-            <a:avLst/>
-          </a:prstGeom>
-          <a:ln>
-            <a:solidFill>
-              <a:srgbClr val="C00000"/>
-            </a:solidFill>
-            <a:tailEnd type="triangle"/>
-          </a:ln>
-        </p:spPr>
-        <p:style>
-          <a:lnRef idx="1">
-            <a:schemeClr val="accent1"/>
-          </a:lnRef>
-          <a:fillRef idx="0">
-            <a:schemeClr val="accent1"/>
-          </a:fillRef>
-          <a:effectRef idx="0">
-            <a:schemeClr val="accent1"/>
-          </a:effectRef>
-          <a:fontRef idx="minor">
-            <a:schemeClr val="tx1"/>
-          </a:fontRef>
-        </p:style>
-      </p:cxnSp>
-      <p:cxnSp>
-        <p:nvCxnSpPr>
-          <p:cNvPr id="21" name="Straight Arrow Connector 20"/>
-          <p:cNvCxnSpPr/>
-          <p:nvPr/>
-        </p:nvCxnSpPr>
-        <p:spPr>
-          <a:xfrm flipH="1" flipV="1">
-            <a:off x="4308231" y="4079631"/>
-            <a:ext cx="2489612" cy="1563181"/>
-          </a:xfrm>
-          <a:prstGeom prst="straightConnector1">
-            <a:avLst/>
-          </a:prstGeom>
-          <a:ln>
-            <a:tailEnd type="triangle"/>
-          </a:ln>
-        </p:spPr>
-        <p:style>
-          <a:lnRef idx="1">
-            <a:schemeClr val="accent1"/>
-          </a:lnRef>
-          <a:fillRef idx="0">
-            <a:schemeClr val="accent1"/>
-          </a:fillRef>
-          <a:effectRef idx="0">
-            <a:schemeClr val="accent1"/>
-          </a:effectRef>
-          <a:fontRef idx="minor">
-            <a:schemeClr val="tx1"/>
-          </a:fontRef>
-        </p:style>
-      </p:cxnSp>
-      <p:sp>
-        <p:nvSpPr>
-          <p:cNvPr id="22" name="TextBox 21"/>
-          <p:cNvSpPr txBox="1"/>
-          <p:nvPr/>
-        </p:nvSpPr>
-        <p:spPr>
-          <a:xfrm>
-            <a:off x="6797842" y="5458145"/>
-            <a:ext cx="5221705" cy="369332"/>
-          </a:xfrm>
-          <a:prstGeom prst="rect">
-            <a:avLst/>
-          </a:prstGeom>
-          <a:noFill/>
-        </p:spPr>
-        <p:txBody>
-          <a:bodyPr wrap="square" rtlCol="0">
-            <a:spAutoFit/>
-          </a:bodyPr>
-          <a:lstStyle/>
-          <a:p>
-            <a:r>
-              <a:rPr lang="en-US" dirty="0"/>
-              <a:t>Explicitly declare type of </a:t>
-            </a:r>
-            <a:r>
-              <a:rPr lang="en-US" i="1" dirty="0"/>
-              <a:t>someNumber2 </a:t>
-            </a:r>
-            <a:r>
-              <a:rPr lang="en-US" dirty="0"/>
-              <a:t>as </a:t>
-            </a:r>
-            <a:r>
-              <a:rPr lang="en-US" i="1" dirty="0"/>
-              <a:t>number</a:t>
-            </a:r>
-          </a:p>
-        </p:txBody>
-      </p:sp>
-      <p:sp>
-        <p:nvSpPr>
-          <p:cNvPr id="25" name="TextBox 24"/>
-          <p:cNvSpPr txBox="1"/>
-          <p:nvPr/>
-        </p:nvSpPr>
-        <p:spPr>
-          <a:xfrm>
-            <a:off x="6096000" y="2384092"/>
-            <a:ext cx="1632498" cy="369332"/>
-          </a:xfrm>
-          <a:prstGeom prst="rect">
-            <a:avLst/>
-          </a:prstGeom>
-          <a:noFill/>
-        </p:spPr>
-        <p:txBody>
-          <a:bodyPr wrap="none" rtlCol="0">
-            <a:spAutoFit/>
-          </a:bodyPr>
-          <a:lstStyle/>
-          <a:p>
-            <a:r>
-              <a:rPr lang="en-US" dirty="0"/>
-              <a:t>Compile errors:</a:t>
-            </a:r>
-          </a:p>
-        </p:txBody>
-      </p:sp>
       <p:pic>
         <p:nvPicPr>
-          <p:cNvPr id="4102" name="Picture 6" descr="http://puu.sh/of5XG/6d2a39b4b4.png"/>
+          <p:cNvPr id="2050" name="Picture 2" descr="http://levelup.lishman.com/images/angular2.png"/>
           <p:cNvPicPr>
-            <a:picLocks noChangeAspect="1" noChangeArrowheads="1"/>
+            <a:picLocks noGrp="1" noChangeAspect="1" noChangeArrowheads="1"/>
           </p:cNvPicPr>
-          <p:nvPr/>
+          <p:nvPr>
+            <p:ph idx="1"/>
+          </p:nvPr>
         </p:nvPicPr>
         <p:blipFill>
           <a:blip r:embed="rId3">
@@ -4421,8 +4205,8 @@
         </p:blipFill>
         <p:spPr bwMode="auto">
           <a:xfrm>
-            <a:off x="0" y="5809561"/>
-            <a:ext cx="5639236" cy="527246"/>
+            <a:off x="1559801" y="2353182"/>
+            <a:ext cx="2835447" cy="2998910"/>
           </a:xfrm>
           <a:prstGeom prst="rect">
             <a:avLst/>
@@ -4441,7 +4225,7 @@
       </p:pic>
       <p:pic>
         <p:nvPicPr>
-          <p:cNvPr id="4104" name="Picture 8" descr="http://puu.sh/of62u/abe72b606f.png"/>
+          <p:cNvPr id="2052" name="Picture 4" descr="http://res.cloudinary.com/demo/image/fetch/fl_png8/https:/www.google.com/images/branding/googlelogo/2x/googlelogo_color_272x92dp.png"/>
           <p:cNvPicPr>
             <a:picLocks noChangeAspect="1" noChangeArrowheads="1"/>
           </p:cNvPicPr>
@@ -4462,8 +4246,8 @@
         </p:blipFill>
         <p:spPr bwMode="auto">
           <a:xfrm>
-            <a:off x="6096000" y="2748062"/>
-            <a:ext cx="6096000" cy="2351475"/>
+            <a:off x="6311290" y="2581796"/>
+            <a:ext cx="3215298" cy="1087527"/>
           </a:xfrm>
           <a:prstGeom prst="rect">
             <a:avLst/>
@@ -4480,43 +4264,40 @@
           </a:extLst>
         </p:spPr>
       </p:pic>
-      <p:sp>
-        <p:nvSpPr>
-          <p:cNvPr id="30" name="TextBox 29"/>
-          <p:cNvSpPr txBox="1"/>
+      <p:pic>
+        <p:nvPicPr>
+          <p:cNvPr id="5" name="Picture 4"/>
+          <p:cNvPicPr>
+            <a:picLocks noChangeAspect="1"/>
+          </p:cNvPicPr>
           <p:nvPr/>
-        </p:nvSpPr>
+        </p:nvPicPr>
+        <p:blipFill>
+          <a:blip r:embed="rId5" cstate="print">
+            <a:extLst>
+              <a:ext uri="{28A0092B-C50C-407E-A947-70E740481C1C}">
+                <a14:useLocalDpi xmlns:a14="http://schemas.microsoft.com/office/drawing/2010/main" val="0"/>
+              </a:ext>
+            </a:extLst>
+          </a:blip>
+          <a:stretch>
+            <a:fillRect/>
+          </a:stretch>
+        </p:blipFill>
         <p:spPr>
           <a:xfrm>
-            <a:off x="0" y="1679862"/>
-            <a:ext cx="1550681" cy="369332"/>
+            <a:off x="5926016" y="4447775"/>
+            <a:ext cx="3985846" cy="850391"/>
           </a:xfrm>
           <a:prstGeom prst="rect">
             <a:avLst/>
           </a:prstGeom>
-          <a:noFill/>
-        </p:spPr>
-        <p:txBody>
-          <a:bodyPr wrap="none" rtlCol="0">
-            <a:spAutoFit/>
-          </a:bodyPr>
-          <a:lstStyle/>
-          <a:p>
-            <a:r>
-              <a:rPr lang="en-US" dirty="0" err="1"/>
-              <a:t>VScode</a:t>
-            </a:r>
-            <a:r>
-              <a:rPr lang="en-US" dirty="0"/>
-              <a:t> errors:</a:t>
-            </a:r>
-          </a:p>
-        </p:txBody>
-      </p:sp>
+        </p:spPr>
+      </p:pic>
     </p:spTree>
     <p:extLst>
       <p:ext uri="{BB962C8B-B14F-4D97-AF65-F5344CB8AC3E}">
-        <p14:creationId xmlns:p14="http://schemas.microsoft.com/office/powerpoint/2010/main" val="3754047467"/>
+        <p14:creationId xmlns:p14="http://schemas.microsoft.com/office/powerpoint/2010/main" val="1671910564"/>
       </p:ext>
     </p:extLst>
   </p:cSld>
@@ -4555,61 +4336,20 @@
           <a:chExt cx="0" cy="0"/>
         </a:xfrm>
       </p:grpSpPr>
-      <p:pic>
-        <p:nvPicPr>
-          <p:cNvPr id="5122" name="Picture 2" descr="http://puu.sh/of6iM/3a83f9d7dd.png"/>
-          <p:cNvPicPr>
-            <a:picLocks noChangeAspect="1" noChangeArrowheads="1"/>
-          </p:cNvPicPr>
-          <p:nvPr/>
-        </p:nvPicPr>
-        <p:blipFill>
-          <a:blip r:embed="rId2">
-            <a:extLst>
-              <a:ext uri="{28A0092B-C50C-407E-A947-70E740481C1C}">
-                <a14:useLocalDpi xmlns:a14="http://schemas.microsoft.com/office/drawing/2010/main" val="0"/>
-              </a:ext>
-            </a:extLst>
-          </a:blip>
-          <a:srcRect/>
-          <a:stretch>
-            <a:fillRect/>
-          </a:stretch>
-        </p:blipFill>
-        <p:spPr bwMode="auto">
-          <a:xfrm>
-            <a:off x="-1" y="1397616"/>
-            <a:ext cx="6294671" cy="3653312"/>
-          </a:xfrm>
-          <a:prstGeom prst="rect">
-            <a:avLst/>
-          </a:prstGeom>
-          <a:noFill/>
-          <a:extLst>
-            <a:ext uri="{909E8E84-426E-40DD-AFC4-6F175D3DCCD1}">
-              <a14:hiddenFill xmlns:a14="http://schemas.microsoft.com/office/drawing/2010/main">
-                <a:solidFill>
-                  <a:srgbClr val="FFFFFF"/>
-                </a:solidFill>
-              </a14:hiddenFill>
-            </a:ext>
-          </a:extLst>
-        </p:spPr>
-      </p:pic>
-      <p:sp>
-        <p:nvSpPr>
-          <p:cNvPr id="2" name="Title 1"/>
+      <p:sp>
+        <p:nvSpPr>
+          <p:cNvPr id="3" name="Content Placeholder 2"/>
           <p:cNvSpPr>
             <a:spLocks noGrp="1"/>
           </p:cNvSpPr>
           <p:nvPr>
-            <p:ph type="title"/>
+            <p:ph idx="1"/>
           </p:nvPr>
         </p:nvSpPr>
         <p:spPr>
           <a:xfrm>
-            <a:off x="0" y="0"/>
-            <a:ext cx="2225841" cy="651577"/>
+            <a:off x="1341120" y="216568"/>
+            <a:ext cx="9509760" cy="5813011"/>
           </a:xfrm>
         </p:spPr>
         <p:txBody>
@@ -4618,222 +4358,182 @@
           </a:bodyPr>
           <a:lstStyle/>
           <a:p>
-            <a:r>
-              <a:rPr lang="en-US" dirty="0"/>
-              <a:t>Types Cont.</a:t>
-            </a:r>
-          </a:p>
-        </p:txBody>
-      </p:sp>
-      <p:cxnSp>
-        <p:nvCxnSpPr>
-          <p:cNvPr id="5" name="Straight Arrow Connector 4"/>
-          <p:cNvCxnSpPr/>
-          <p:nvPr/>
-        </p:nvCxnSpPr>
-        <p:spPr>
-          <a:xfrm flipH="1">
-            <a:off x="3507753" y="1404839"/>
-            <a:ext cx="2786917" cy="1043194"/>
-          </a:xfrm>
-          <a:prstGeom prst="straightConnector1">
-            <a:avLst/>
-          </a:prstGeom>
-          <a:ln>
-            <a:tailEnd type="triangle"/>
-          </a:ln>
-        </p:spPr>
-        <p:style>
-          <a:lnRef idx="1">
-            <a:schemeClr val="accent1"/>
-          </a:lnRef>
-          <a:fillRef idx="0">
-            <a:schemeClr val="accent1"/>
-          </a:fillRef>
-          <a:effectRef idx="0">
-            <a:schemeClr val="accent1"/>
-          </a:effectRef>
-          <a:fontRef idx="minor">
-            <a:schemeClr val="tx1"/>
-          </a:fontRef>
-        </p:style>
-      </p:cxnSp>
-      <p:sp>
-        <p:nvSpPr>
-          <p:cNvPr id="8" name="TextBox 7"/>
-          <p:cNvSpPr txBox="1"/>
-          <p:nvPr/>
-        </p:nvSpPr>
-        <p:spPr>
-          <a:xfrm>
-            <a:off x="6294670" y="1188364"/>
-            <a:ext cx="2859181" cy="369332"/>
-          </a:xfrm>
-          <a:prstGeom prst="rect">
-            <a:avLst/>
-          </a:prstGeom>
-          <a:noFill/>
-        </p:spPr>
-        <p:txBody>
-          <a:bodyPr wrap="none" rtlCol="0">
-            <a:spAutoFit/>
-          </a:bodyPr>
-          <a:lstStyle/>
-          <a:p>
-            <a:r>
-              <a:rPr lang="en-US" dirty="0"/>
-              <a:t>Infers return type as </a:t>
-            </a:r>
-            <a:r>
-              <a:rPr lang="en-US" i="1" dirty="0"/>
-              <a:t>number</a:t>
-            </a:r>
-          </a:p>
-        </p:txBody>
-      </p:sp>
-      <p:cxnSp>
-        <p:nvCxnSpPr>
-          <p:cNvPr id="12" name="Straight Arrow Connector 11"/>
-          <p:cNvCxnSpPr/>
-          <p:nvPr/>
-        </p:nvCxnSpPr>
-        <p:spPr>
-          <a:xfrm flipH="1" flipV="1">
-            <a:off x="1352196" y="5123380"/>
-            <a:ext cx="1630259" cy="1325546"/>
-          </a:xfrm>
-          <a:prstGeom prst="straightConnector1">
-            <a:avLst/>
-          </a:prstGeom>
-          <a:ln>
-            <a:solidFill>
-              <a:srgbClr val="C00000"/>
-            </a:solidFill>
-            <a:tailEnd type="triangle"/>
-          </a:ln>
-        </p:spPr>
-        <p:style>
-          <a:lnRef idx="1">
-            <a:schemeClr val="accent1"/>
-          </a:lnRef>
-          <a:fillRef idx="0">
-            <a:schemeClr val="accent1"/>
-          </a:fillRef>
-          <a:effectRef idx="0">
-            <a:schemeClr val="accent1"/>
-          </a:effectRef>
-          <a:fontRef idx="minor">
-            <a:schemeClr val="tx1"/>
-          </a:fontRef>
-        </p:style>
-      </p:cxnSp>
-      <p:cxnSp>
-        <p:nvCxnSpPr>
-          <p:cNvPr id="10" name="Straight Arrow Connector 9"/>
-          <p:cNvCxnSpPr/>
-          <p:nvPr/>
-        </p:nvCxnSpPr>
-        <p:spPr>
-          <a:xfrm flipH="1">
-            <a:off x="2982455" y="502826"/>
-            <a:ext cx="1634896" cy="1872735"/>
-          </a:xfrm>
-          <a:prstGeom prst="straightConnector1">
-            <a:avLst/>
-          </a:prstGeom>
-          <a:ln>
-            <a:tailEnd type="triangle"/>
-          </a:ln>
-        </p:spPr>
-        <p:style>
-          <a:lnRef idx="1">
-            <a:schemeClr val="accent1"/>
-          </a:lnRef>
-          <a:fillRef idx="0">
-            <a:schemeClr val="accent1"/>
-          </a:fillRef>
-          <a:effectRef idx="0">
-            <a:schemeClr val="accent1"/>
-          </a:effectRef>
-          <a:fontRef idx="minor">
-            <a:schemeClr val="tx1"/>
-          </a:fontRef>
-        </p:style>
-      </p:cxnSp>
-      <p:sp>
-        <p:nvSpPr>
-          <p:cNvPr id="11" name="TextBox 10"/>
-          <p:cNvSpPr txBox="1"/>
-          <p:nvPr/>
-        </p:nvSpPr>
-        <p:spPr>
-          <a:xfrm>
-            <a:off x="4555700" y="204016"/>
-            <a:ext cx="3168560" cy="369332"/>
-          </a:xfrm>
-          <a:prstGeom prst="rect">
-            <a:avLst/>
-          </a:prstGeom>
-          <a:noFill/>
-        </p:spPr>
-        <p:txBody>
-          <a:bodyPr wrap="none" rtlCol="0">
-            <a:spAutoFit/>
-          </a:bodyPr>
-          <a:lstStyle/>
-          <a:p>
-            <a:r>
-              <a:rPr lang="en-US" dirty="0"/>
-              <a:t>Explicitly define parameter type</a:t>
-            </a:r>
-          </a:p>
-        </p:txBody>
-      </p:sp>
-      <p:pic>
-        <p:nvPicPr>
-          <p:cNvPr id="5124" name="Picture 4" descr="http://puu.sh/of6qI/725b7369dd.png"/>
-          <p:cNvPicPr>
-            <a:picLocks noChangeAspect="1" noChangeArrowheads="1"/>
-          </p:cNvPicPr>
-          <p:nvPr/>
-        </p:nvPicPr>
-        <p:blipFill>
-          <a:blip r:embed="rId3">
-            <a:extLst>
-              <a:ext uri="{28A0092B-C50C-407E-A947-70E740481C1C}">
-                <a14:useLocalDpi xmlns:a14="http://schemas.microsoft.com/office/drawing/2010/main" val="0"/>
-              </a:ext>
-            </a:extLst>
-          </a:blip>
-          <a:srcRect/>
-          <a:stretch>
-            <a:fillRect/>
-          </a:stretch>
-        </p:blipFill>
-        <p:spPr bwMode="auto">
-          <a:xfrm>
-            <a:off x="3024999" y="5195851"/>
-            <a:ext cx="9167001" cy="1662150"/>
-          </a:xfrm>
-          <a:prstGeom prst="rect">
-            <a:avLst/>
-          </a:prstGeom>
-          <a:noFill/>
-          <a:extLst>
-            <a:ext uri="{909E8E84-426E-40DD-AFC4-6F175D3DCCD1}">
-              <a14:hiddenFill xmlns:a14="http://schemas.microsoft.com/office/drawing/2010/main">
+            <a:pPr marL="45720" indent="0" algn="ctr">
+              <a:buNone/>
+            </a:pPr>
+            <a:r>
+              <a:rPr lang="en-US" sz="3200" dirty="0">
+                <a:latin typeface="Consolas" panose="020B0609020204030204" pitchFamily="49" charset="0"/>
+              </a:rPr>
+              <a:t>Open </a:t>
+            </a:r>
+            <a:r>
+              <a:rPr lang="en-US" sz="3200" dirty="0" err="1">
+                <a:latin typeface="Consolas" panose="020B0609020204030204" pitchFamily="49" charset="0"/>
+              </a:rPr>
+              <a:t>git</a:t>
+            </a:r>
+            <a:r>
+              <a:rPr lang="en-US" sz="3200" dirty="0">
+                <a:latin typeface="Consolas" panose="020B0609020204030204" pitchFamily="49" charset="0"/>
+              </a:rPr>
+              <a:t> bash or terminal</a:t>
+            </a:r>
+          </a:p>
+          <a:p>
+            <a:pPr marL="45720" indent="0" algn="ctr">
+              <a:buNone/>
+            </a:pPr>
+            <a:endParaRPr lang="en-US" dirty="0">
+              <a:latin typeface="Consolas" panose="020B0609020204030204" pitchFamily="49" charset="0"/>
+            </a:endParaRPr>
+          </a:p>
+          <a:p>
+            <a:pPr marL="45720" indent="0">
+              <a:buNone/>
+            </a:pPr>
+            <a:r>
+              <a:rPr lang="en-US" sz="2400" dirty="0" err="1">
+                <a:latin typeface="Consolas" panose="020B0609020204030204" pitchFamily="49" charset="0"/>
+              </a:rPr>
+              <a:t>git</a:t>
+            </a:r>
+            <a:r>
+              <a:rPr lang="en-US" sz="2400" dirty="0">
+                <a:latin typeface="Consolas" panose="020B0609020204030204" pitchFamily="49" charset="0"/>
+              </a:rPr>
+              <a:t> clone https://github.com/chcaru/workshop.git</a:t>
+            </a:r>
+          </a:p>
+          <a:p>
+            <a:pPr marL="45720" indent="0">
+              <a:buNone/>
+            </a:pPr>
+            <a:r>
+              <a:rPr lang="en-US" sz="2400" dirty="0">
+                <a:latin typeface="Consolas" panose="020B0609020204030204" pitchFamily="49" charset="0"/>
+              </a:rPr>
+              <a:t>cd workshop/typescript/start</a:t>
+            </a:r>
+          </a:p>
+          <a:p>
+            <a:pPr marL="45720" indent="0">
+              <a:buNone/>
+            </a:pPr>
+            <a:r>
+              <a:rPr lang="en-US" sz="2400" dirty="0" err="1">
+                <a:latin typeface="Consolas" panose="020B0609020204030204" pitchFamily="49" charset="0"/>
+              </a:rPr>
+              <a:t>npm</a:t>
+            </a:r>
+            <a:r>
+              <a:rPr lang="en-US" sz="2400" dirty="0">
+                <a:latin typeface="Consolas" panose="020B0609020204030204" pitchFamily="49" charset="0"/>
+              </a:rPr>
+              <a:t> install –g typescript</a:t>
+            </a:r>
+          </a:p>
+          <a:p>
+            <a:pPr marL="45720" indent="0">
+              <a:buNone/>
+            </a:pPr>
+            <a:r>
+              <a:rPr lang="en-US" sz="2400" dirty="0">
+                <a:latin typeface="Consolas" panose="020B0609020204030204" pitchFamily="49" charset="0"/>
+              </a:rPr>
+              <a:t>start code .</a:t>
+            </a:r>
+          </a:p>
+          <a:p>
+            <a:pPr marL="45720" indent="0">
+              <a:buNone/>
+            </a:pPr>
+            <a:r>
+              <a:rPr lang="en-US" sz="2400" dirty="0" err="1">
+                <a:latin typeface="Consolas" panose="020B0609020204030204" pitchFamily="49" charset="0"/>
+              </a:rPr>
+              <a:t>tsc</a:t>
+            </a:r>
+            <a:r>
+              <a:rPr lang="en-US" sz="2400" dirty="0">
+                <a:latin typeface="Consolas" panose="020B0609020204030204" pitchFamily="49" charset="0"/>
+              </a:rPr>
+              <a:t> –w –pretty </a:t>
+            </a:r>
+          </a:p>
+          <a:p>
+            <a:pPr marL="45720" indent="0">
+              <a:buNone/>
+            </a:pPr>
+            <a:endParaRPr lang="en-US" sz="2400" dirty="0">
+              <a:latin typeface="Consolas" panose="020B0609020204030204" pitchFamily="49" charset="0"/>
+            </a:endParaRPr>
+          </a:p>
+          <a:p>
+            <a:pPr marL="45720" indent="0">
+              <a:buNone/>
+            </a:pPr>
+            <a:r>
+              <a:rPr lang="en-US" sz="2400" dirty="0">
                 <a:solidFill>
-                  <a:srgbClr val="FFFFFF"/>
+                  <a:schemeClr val="accent1"/>
                 </a:solidFill>
-              </a14:hiddenFill>
-            </a:ext>
-          </a:extLst>
-        </p:spPr>
-      </p:pic>
+                <a:latin typeface="Consolas" panose="020B0609020204030204" pitchFamily="49" charset="0"/>
+              </a:rPr>
+              <a:t>IF </a:t>
+            </a:r>
+            <a:r>
+              <a:rPr lang="en-US" sz="2800" b="1" u="sng" dirty="0">
+                <a:solidFill>
+                  <a:schemeClr val="accent1"/>
+                </a:solidFill>
+                <a:latin typeface="Consolas" panose="020B0609020204030204" pitchFamily="49" charset="0"/>
+              </a:rPr>
+              <a:t>NOT</a:t>
+            </a:r>
+            <a:r>
+              <a:rPr lang="en-US" sz="2400" dirty="0">
+                <a:solidFill>
+                  <a:schemeClr val="accent1"/>
+                </a:solidFill>
+                <a:latin typeface="Consolas" panose="020B0609020204030204" pitchFamily="49" charset="0"/>
+              </a:rPr>
+              <a:t> USING VSCODE, USE THIS TO RUN OUR CODE:</a:t>
+            </a:r>
+          </a:p>
+          <a:p>
+            <a:pPr marL="45720" indent="0">
+              <a:buNone/>
+            </a:pPr>
+            <a:r>
+              <a:rPr lang="en-US" sz="2400" dirty="0">
+                <a:latin typeface="Consolas" panose="020B0609020204030204" pitchFamily="49" charset="0"/>
+              </a:rPr>
+              <a:t>node bin/main.js</a:t>
+            </a:r>
+          </a:p>
+          <a:p>
+            <a:pPr marL="45720" indent="0">
+              <a:buNone/>
+            </a:pPr>
+            <a:endParaRPr lang="en-US" sz="2400" dirty="0">
+              <a:latin typeface="Consolas" panose="020B0609020204030204" pitchFamily="49" charset="0"/>
+            </a:endParaRPr>
+          </a:p>
+          <a:p>
+            <a:pPr marL="45720" indent="0">
+              <a:buNone/>
+            </a:pPr>
+            <a:endParaRPr lang="en-US" dirty="0">
+              <a:latin typeface="Consolas" panose="020B0609020204030204" pitchFamily="49" charset="0"/>
+            </a:endParaRPr>
+          </a:p>
+        </p:txBody>
+      </p:sp>
     </p:spTree>
     <p:extLst>
       <p:ext uri="{BB962C8B-B14F-4D97-AF65-F5344CB8AC3E}">
-        <p14:creationId xmlns:p14="http://schemas.microsoft.com/office/powerpoint/2010/main" val="3210575785"/>
+        <p14:creationId xmlns:p14="http://schemas.microsoft.com/office/powerpoint/2010/main" val="1596373389"/>
       </p:ext>
     </p:extLst>
   </p:cSld>
@@ -4872,9 +4572,38 @@
           <a:chExt cx="0" cy="0"/>
         </a:xfrm>
       </p:grpSpPr>
+      <p:sp>
+        <p:nvSpPr>
+          <p:cNvPr id="2" name="Title 1"/>
+          <p:cNvSpPr>
+            <a:spLocks noGrp="1"/>
+          </p:cNvSpPr>
+          <p:nvPr>
+            <p:ph type="title"/>
+          </p:nvPr>
+        </p:nvSpPr>
+        <p:spPr>
+          <a:xfrm>
+            <a:off x="0" y="0"/>
+            <a:ext cx="2352575" cy="651577"/>
+          </a:xfrm>
+        </p:spPr>
+        <p:txBody>
+          <a:bodyPr>
+            <a:normAutofit/>
+          </a:bodyPr>
+          <a:lstStyle/>
+          <a:p>
+            <a:r>
+              <a:rPr lang="en-US" dirty="0"/>
+              <a:t>Types</a:t>
+            </a:r>
+          </a:p>
+        </p:txBody>
+      </p:sp>
       <p:pic>
         <p:nvPicPr>
-          <p:cNvPr id="4" name="Picture 6" descr="http://puu.sh/of6Am/e88a635a99.png"/>
+          <p:cNvPr id="4098" name="Picture 2" descr="http://puu.sh/of5rK/1bdc9bd6e3.png"/>
           <p:cNvPicPr>
             <a:picLocks noChangeAspect="1" noChangeArrowheads="1"/>
           </p:cNvPicPr>
@@ -4895,8 +4624,8 @@
         </p:blipFill>
         <p:spPr bwMode="auto">
           <a:xfrm>
-            <a:off x="-11033" y="2546291"/>
-            <a:ext cx="6593305" cy="1355418"/>
+            <a:off x="0" y="2021388"/>
+            <a:ext cx="4988169" cy="3075610"/>
           </a:xfrm>
           <a:prstGeom prst="rect">
             <a:avLst/>
@@ -4913,15 +4642,228 @@
           </a:extLst>
         </p:spPr>
       </p:pic>
+      <p:cxnSp>
+        <p:nvCxnSpPr>
+          <p:cNvPr id="5" name="Straight Arrow Connector 4"/>
+          <p:cNvCxnSpPr/>
+          <p:nvPr/>
+        </p:nvCxnSpPr>
+        <p:spPr>
+          <a:xfrm flipH="1">
+            <a:off x="2803360" y="1091130"/>
+            <a:ext cx="2310061" cy="1058779"/>
+          </a:xfrm>
+          <a:prstGeom prst="straightConnector1">
+            <a:avLst/>
+          </a:prstGeom>
+          <a:ln>
+            <a:tailEnd type="triangle"/>
+          </a:ln>
+        </p:spPr>
+        <p:style>
+          <a:lnRef idx="1">
+            <a:schemeClr val="accent1"/>
+          </a:lnRef>
+          <a:fillRef idx="0">
+            <a:schemeClr val="accent1"/>
+          </a:fillRef>
+          <a:effectRef idx="0">
+            <a:schemeClr val="accent1"/>
+          </a:effectRef>
+          <a:fontRef idx="minor">
+            <a:schemeClr val="tx1"/>
+          </a:fontRef>
+        </p:style>
+      </p:cxnSp>
+      <p:sp>
+        <p:nvSpPr>
+          <p:cNvPr id="8" name="TextBox 7"/>
+          <p:cNvSpPr txBox="1"/>
+          <p:nvPr/>
+        </p:nvSpPr>
+        <p:spPr>
+          <a:xfrm>
+            <a:off x="5113421" y="906464"/>
+            <a:ext cx="3796360" cy="369332"/>
+          </a:xfrm>
+          <a:prstGeom prst="rect">
+            <a:avLst/>
+          </a:prstGeom>
+          <a:noFill/>
+        </p:spPr>
+        <p:txBody>
+          <a:bodyPr wrap="none" rtlCol="0">
+            <a:spAutoFit/>
+          </a:bodyPr>
+          <a:lstStyle/>
+          <a:p>
+            <a:r>
+              <a:rPr lang="en-US" dirty="0"/>
+              <a:t>Infers type of </a:t>
+            </a:r>
+            <a:r>
+              <a:rPr lang="en-US" i="1" dirty="0" err="1"/>
+              <a:t>someNumber</a:t>
+            </a:r>
+            <a:r>
+              <a:rPr lang="en-US" dirty="0"/>
+              <a:t> as </a:t>
+            </a:r>
+            <a:r>
+              <a:rPr lang="en-US" i="1" dirty="0"/>
+              <a:t>number</a:t>
+            </a:r>
+          </a:p>
+        </p:txBody>
+      </p:sp>
+      <p:cxnSp>
+        <p:nvCxnSpPr>
+          <p:cNvPr id="12" name="Straight Arrow Connector 11"/>
+          <p:cNvCxnSpPr/>
+          <p:nvPr/>
+        </p:nvCxnSpPr>
+        <p:spPr>
+          <a:xfrm flipH="1" flipV="1">
+            <a:off x="3909647" y="2907994"/>
+            <a:ext cx="2186353" cy="172173"/>
+          </a:xfrm>
+          <a:prstGeom prst="straightConnector1">
+            <a:avLst/>
+          </a:prstGeom>
+          <a:ln>
+            <a:solidFill>
+              <a:srgbClr val="C00000"/>
+            </a:solidFill>
+            <a:tailEnd type="triangle"/>
+          </a:ln>
+        </p:spPr>
+        <p:style>
+          <a:lnRef idx="1">
+            <a:schemeClr val="accent1"/>
+          </a:lnRef>
+          <a:fillRef idx="0">
+            <a:schemeClr val="accent1"/>
+          </a:fillRef>
+          <a:effectRef idx="0">
+            <a:schemeClr val="accent1"/>
+          </a:effectRef>
+          <a:fontRef idx="minor">
+            <a:schemeClr val="tx1"/>
+          </a:fontRef>
+        </p:style>
+      </p:cxnSp>
+      <p:cxnSp>
+        <p:nvCxnSpPr>
+          <p:cNvPr id="21" name="Straight Arrow Connector 20"/>
+          <p:cNvCxnSpPr/>
+          <p:nvPr/>
+        </p:nvCxnSpPr>
+        <p:spPr>
+          <a:xfrm flipH="1" flipV="1">
+            <a:off x="4308231" y="4079631"/>
+            <a:ext cx="2489612" cy="1563181"/>
+          </a:xfrm>
+          <a:prstGeom prst="straightConnector1">
+            <a:avLst/>
+          </a:prstGeom>
+          <a:ln>
+            <a:tailEnd type="triangle"/>
+          </a:ln>
+        </p:spPr>
+        <p:style>
+          <a:lnRef idx="1">
+            <a:schemeClr val="accent1"/>
+          </a:lnRef>
+          <a:fillRef idx="0">
+            <a:schemeClr val="accent1"/>
+          </a:fillRef>
+          <a:effectRef idx="0">
+            <a:schemeClr val="accent1"/>
+          </a:effectRef>
+          <a:fontRef idx="minor">
+            <a:schemeClr val="tx1"/>
+          </a:fontRef>
+        </p:style>
+      </p:cxnSp>
+      <p:sp>
+        <p:nvSpPr>
+          <p:cNvPr id="22" name="TextBox 21"/>
+          <p:cNvSpPr txBox="1"/>
+          <p:nvPr/>
+        </p:nvSpPr>
+        <p:spPr>
+          <a:xfrm>
+            <a:off x="6797842" y="5458145"/>
+            <a:ext cx="5221705" cy="369332"/>
+          </a:xfrm>
+          <a:prstGeom prst="rect">
+            <a:avLst/>
+          </a:prstGeom>
+          <a:noFill/>
+        </p:spPr>
+        <p:txBody>
+          <a:bodyPr wrap="square" rtlCol="0">
+            <a:spAutoFit/>
+          </a:bodyPr>
+          <a:lstStyle/>
+          <a:p>
+            <a:r>
+              <a:rPr lang="en-US" dirty="0"/>
+              <a:t>Explicitly declare type of </a:t>
+            </a:r>
+            <a:r>
+              <a:rPr lang="en-US" i="1" dirty="0"/>
+              <a:t>someNumber2 </a:t>
+            </a:r>
+            <a:r>
+              <a:rPr lang="en-US" dirty="0"/>
+              <a:t>as </a:t>
+            </a:r>
+            <a:r>
+              <a:rPr lang="en-US" i="1" dirty="0"/>
+              <a:t>number</a:t>
+            </a:r>
+          </a:p>
+        </p:txBody>
+      </p:sp>
+      <p:sp>
+        <p:nvSpPr>
+          <p:cNvPr id="25" name="TextBox 24"/>
+          <p:cNvSpPr txBox="1"/>
+          <p:nvPr/>
+        </p:nvSpPr>
+        <p:spPr>
+          <a:xfrm>
+            <a:off x="6096000" y="2384092"/>
+            <a:ext cx="1632498" cy="369332"/>
+          </a:xfrm>
+          <a:prstGeom prst="rect">
+            <a:avLst/>
+          </a:prstGeom>
+          <a:noFill/>
+        </p:spPr>
+        <p:txBody>
+          <a:bodyPr wrap="none" rtlCol="0">
+            <a:spAutoFit/>
+          </a:bodyPr>
+          <a:lstStyle/>
+          <a:p>
+            <a:r>
+              <a:rPr lang="en-US" dirty="0"/>
+              <a:t>Compile errors:</a:t>
+            </a:r>
+          </a:p>
+        </p:txBody>
+      </p:sp>
       <p:pic>
         <p:nvPicPr>
-          <p:cNvPr id="5" name="Picture 2" descr="http://puu.sh/of6iM/3a83f9d7dd.png"/>
+          <p:cNvPr id="4102" name="Picture 6" descr="http://puu.sh/of5XG/6d2a39b4b4.png"/>
           <p:cNvPicPr>
             <a:picLocks noChangeAspect="1" noChangeArrowheads="1"/>
           </p:cNvPicPr>
           <p:nvPr/>
         </p:nvPicPr>
-        <p:blipFill rotWithShape="1">
+        <p:blipFill>
           <a:blip r:embed="rId3">
             <a:extLst>
               <a:ext uri="{28A0092B-C50C-407E-A947-70E740481C1C}">
@@ -4929,13 +4871,15 @@
               </a:ext>
             </a:extLst>
           </a:blip>
-          <a:srcRect t="26743" r="37880" b="44067"/>
-          <a:stretch/>
+          <a:srcRect/>
+          <a:stretch>
+            <a:fillRect/>
+          </a:stretch>
         </p:blipFill>
         <p:spPr bwMode="auto">
           <a:xfrm>
-            <a:off x="0" y="649705"/>
-            <a:ext cx="4985220" cy="1359569"/>
+            <a:off x="0" y="5809561"/>
+            <a:ext cx="5639236" cy="527246"/>
           </a:xfrm>
           <a:prstGeom prst="rect">
             <a:avLst/>
@@ -4952,67 +4896,9 @@
           </a:extLst>
         </p:spPr>
       </p:pic>
-      <p:sp>
-        <p:nvSpPr>
-          <p:cNvPr id="6" name="TextBox 5"/>
-          <p:cNvSpPr txBox="1"/>
-          <p:nvPr/>
-        </p:nvSpPr>
-        <p:spPr>
-          <a:xfrm>
-            <a:off x="5137484" y="1144823"/>
-            <a:ext cx="1998239" cy="369332"/>
-          </a:xfrm>
-          <a:prstGeom prst="rect">
-            <a:avLst/>
-          </a:prstGeom>
-          <a:noFill/>
-        </p:spPr>
-        <p:txBody>
-          <a:bodyPr wrap="none" rtlCol="0">
-            <a:spAutoFit/>
-          </a:bodyPr>
-          <a:lstStyle/>
-          <a:p>
-            <a:r>
-              <a:rPr lang="en-US" dirty="0"/>
-              <a:t>Implicit return type</a:t>
-            </a:r>
-          </a:p>
-        </p:txBody>
-      </p:sp>
-      <p:sp>
-        <p:nvSpPr>
-          <p:cNvPr id="7" name="TextBox 6"/>
-          <p:cNvSpPr txBox="1"/>
-          <p:nvPr/>
-        </p:nvSpPr>
-        <p:spPr>
-          <a:xfrm>
-            <a:off x="6689558" y="3039334"/>
-            <a:ext cx="1967783" cy="369332"/>
-          </a:xfrm>
-          <a:prstGeom prst="rect">
-            <a:avLst/>
-          </a:prstGeom>
-          <a:noFill/>
-        </p:spPr>
-        <p:txBody>
-          <a:bodyPr wrap="none" rtlCol="0">
-            <a:spAutoFit/>
-          </a:bodyPr>
-          <a:lstStyle/>
-          <a:p>
-            <a:r>
-              <a:rPr lang="en-US" dirty="0"/>
-              <a:t>Explicit return type</a:t>
-            </a:r>
-          </a:p>
-        </p:txBody>
-      </p:sp>
       <p:pic>
         <p:nvPicPr>
-          <p:cNvPr id="6146" name="Picture 2" descr="http://puu.sh/of6GG/4fb5d40820.png"/>
+          <p:cNvPr id="4104" name="Picture 8" descr="http://puu.sh/of62u/abe72b606f.png"/>
           <p:cNvPicPr>
             <a:picLocks noChangeAspect="1" noChangeArrowheads="1"/>
           </p:cNvPicPr>
@@ -5033,8 +4919,8 @@
         </p:blipFill>
         <p:spPr bwMode="auto">
           <a:xfrm>
-            <a:off x="-11033" y="4438727"/>
-            <a:ext cx="6604338" cy="1408620"/>
+            <a:off x="6096000" y="2748062"/>
+            <a:ext cx="6096000" cy="2351475"/>
           </a:xfrm>
           <a:prstGeom prst="rect">
             <a:avLst/>
@@ -5053,14 +4939,14 @@
       </p:pic>
       <p:sp>
         <p:nvSpPr>
-          <p:cNvPr id="9" name="TextBox 8"/>
+          <p:cNvPr id="30" name="TextBox 29"/>
           <p:cNvSpPr txBox="1"/>
           <p:nvPr/>
         </p:nvSpPr>
         <p:spPr>
           <a:xfrm>
-            <a:off x="6689558" y="4933845"/>
-            <a:ext cx="4536948" cy="646331"/>
+            <a:off x="0" y="1679862"/>
+            <a:ext cx="1550681" cy="369332"/>
           </a:xfrm>
           <a:prstGeom prst="rect">
             <a:avLst/>
@@ -5074,22 +4960,12 @@
           <a:lstStyle/>
           <a:p>
             <a:r>
+              <a:rPr lang="en-US" dirty="0" err="1"/>
+              <a:t>VScode</a:t>
+            </a:r>
+            <a:r>
               <a:rPr lang="en-US" dirty="0"/>
-              <a:t>Explicit return type as </a:t>
-            </a:r>
-            <a:r>
-              <a:rPr lang="en-US" i="1" dirty="0"/>
-              <a:t>string</a:t>
-            </a:r>
-            <a:r>
-              <a:rPr lang="en-US" dirty="0"/>
-              <a:t>, produces error</a:t>
-            </a:r>
-          </a:p>
-          <a:p>
-            <a:r>
-              <a:rPr lang="en-US" dirty="0"/>
-              <a:t>because the type being returned is not correct</a:t>
+              <a:t> errors:</a:t>
             </a:r>
           </a:p>
         </p:txBody>
@@ -5097,7 +4973,7 @@
     </p:spTree>
     <p:extLst>
       <p:ext uri="{BB962C8B-B14F-4D97-AF65-F5344CB8AC3E}">
-        <p14:creationId xmlns:p14="http://schemas.microsoft.com/office/powerpoint/2010/main" val="3394341855"/>
+        <p14:creationId xmlns:p14="http://schemas.microsoft.com/office/powerpoint/2010/main" val="3754047467"/>
       </p:ext>
     </p:extLst>
   </p:cSld>
@@ -5138,7 +5014,7 @@
       </p:grpSpPr>
       <p:pic>
         <p:nvPicPr>
-          <p:cNvPr id="7172" name="Picture 4" descr="http://puu.sh/of72H/82cbd165e3.png"/>
+          <p:cNvPr id="5122" name="Picture 2" descr="http://puu.sh/of6iM/3a83f9d7dd.png"/>
           <p:cNvPicPr>
             <a:picLocks noChangeAspect="1" noChangeArrowheads="1"/>
           </p:cNvPicPr>
@@ -5159,8 +5035,8 @@
         </p:blipFill>
         <p:spPr bwMode="auto">
           <a:xfrm>
-            <a:off x="3212432" y="1401511"/>
-            <a:ext cx="5298928" cy="3856288"/>
+            <a:off x="-1" y="1397616"/>
+            <a:ext cx="6294671" cy="3653312"/>
           </a:xfrm>
           <a:prstGeom prst="rect">
             <a:avLst/>
@@ -5177,10 +5053,244 @@
           </a:extLst>
         </p:spPr>
       </p:pic>
+      <p:sp>
+        <p:nvSpPr>
+          <p:cNvPr id="2" name="Title 1"/>
+          <p:cNvSpPr>
+            <a:spLocks noGrp="1"/>
+          </p:cNvSpPr>
+          <p:nvPr>
+            <p:ph type="title"/>
+          </p:nvPr>
+        </p:nvSpPr>
+        <p:spPr>
+          <a:xfrm>
+            <a:off x="0" y="0"/>
+            <a:ext cx="2225841" cy="651577"/>
+          </a:xfrm>
+        </p:spPr>
+        <p:txBody>
+          <a:bodyPr>
+            <a:normAutofit/>
+          </a:bodyPr>
+          <a:lstStyle/>
+          <a:p>
+            <a:r>
+              <a:rPr lang="en-US" dirty="0"/>
+              <a:t>Types Cont.</a:t>
+            </a:r>
+          </a:p>
+        </p:txBody>
+      </p:sp>
+      <p:cxnSp>
+        <p:nvCxnSpPr>
+          <p:cNvPr id="5" name="Straight Arrow Connector 4"/>
+          <p:cNvCxnSpPr/>
+          <p:nvPr/>
+        </p:nvCxnSpPr>
+        <p:spPr>
+          <a:xfrm flipH="1">
+            <a:off x="2478505" y="2586789"/>
+            <a:ext cx="4150895" cy="312822"/>
+          </a:xfrm>
+          <a:prstGeom prst="straightConnector1">
+            <a:avLst/>
+          </a:prstGeom>
+          <a:ln>
+            <a:tailEnd type="triangle"/>
+          </a:ln>
+        </p:spPr>
+        <p:style>
+          <a:lnRef idx="1">
+            <a:schemeClr val="accent1"/>
+          </a:lnRef>
+          <a:fillRef idx="0">
+            <a:schemeClr val="accent1"/>
+          </a:fillRef>
+          <a:effectRef idx="0">
+            <a:schemeClr val="accent1"/>
+          </a:effectRef>
+          <a:fontRef idx="minor">
+            <a:schemeClr val="tx1"/>
+          </a:fontRef>
+        </p:style>
+      </p:cxnSp>
+      <p:sp>
+        <p:nvSpPr>
+          <p:cNvPr id="8" name="TextBox 7"/>
+          <p:cNvSpPr txBox="1"/>
+          <p:nvPr/>
+        </p:nvSpPr>
+        <p:spPr>
+          <a:xfrm>
+            <a:off x="6629400" y="2375561"/>
+            <a:ext cx="2859181" cy="369332"/>
+          </a:xfrm>
+          <a:prstGeom prst="rect">
+            <a:avLst/>
+          </a:prstGeom>
+          <a:noFill/>
+        </p:spPr>
+        <p:txBody>
+          <a:bodyPr wrap="none" rtlCol="0">
+            <a:spAutoFit/>
+          </a:bodyPr>
+          <a:lstStyle/>
+          <a:p>
+            <a:r>
+              <a:rPr lang="en-US" dirty="0"/>
+              <a:t>Infers return type as </a:t>
+            </a:r>
+            <a:r>
+              <a:rPr lang="en-US" i="1" dirty="0"/>
+              <a:t>number</a:t>
+            </a:r>
+          </a:p>
+        </p:txBody>
+      </p:sp>
+      <p:cxnSp>
+        <p:nvCxnSpPr>
+          <p:cNvPr id="12" name="Straight Arrow Connector 11"/>
+          <p:cNvCxnSpPr/>
+          <p:nvPr/>
+        </p:nvCxnSpPr>
+        <p:spPr>
+          <a:xfrm flipH="1" flipV="1">
+            <a:off x="1352196" y="5123380"/>
+            <a:ext cx="1630259" cy="1325546"/>
+          </a:xfrm>
+          <a:prstGeom prst="straightConnector1">
+            <a:avLst/>
+          </a:prstGeom>
+          <a:ln>
+            <a:solidFill>
+              <a:srgbClr val="C00000"/>
+            </a:solidFill>
+            <a:tailEnd type="triangle"/>
+          </a:ln>
+        </p:spPr>
+        <p:style>
+          <a:lnRef idx="1">
+            <a:schemeClr val="accent1"/>
+          </a:lnRef>
+          <a:fillRef idx="0">
+            <a:schemeClr val="accent1"/>
+          </a:fillRef>
+          <a:effectRef idx="0">
+            <a:schemeClr val="accent1"/>
+          </a:effectRef>
+          <a:fontRef idx="minor">
+            <a:schemeClr val="tx1"/>
+          </a:fontRef>
+        </p:style>
+      </p:cxnSp>
+      <p:cxnSp>
+        <p:nvCxnSpPr>
+          <p:cNvPr id="10" name="Straight Arrow Connector 9"/>
+          <p:cNvCxnSpPr/>
+          <p:nvPr/>
+        </p:nvCxnSpPr>
+        <p:spPr>
+          <a:xfrm flipH="1">
+            <a:off x="2982455" y="502826"/>
+            <a:ext cx="1634896" cy="1872735"/>
+          </a:xfrm>
+          <a:prstGeom prst="straightConnector1">
+            <a:avLst/>
+          </a:prstGeom>
+          <a:ln>
+            <a:tailEnd type="triangle"/>
+          </a:ln>
+        </p:spPr>
+        <p:style>
+          <a:lnRef idx="1">
+            <a:schemeClr val="accent1"/>
+          </a:lnRef>
+          <a:fillRef idx="0">
+            <a:schemeClr val="accent1"/>
+          </a:fillRef>
+          <a:effectRef idx="0">
+            <a:schemeClr val="accent1"/>
+          </a:effectRef>
+          <a:fontRef idx="minor">
+            <a:schemeClr val="tx1"/>
+          </a:fontRef>
+        </p:style>
+      </p:cxnSp>
+      <p:sp>
+        <p:nvSpPr>
+          <p:cNvPr id="11" name="TextBox 10"/>
+          <p:cNvSpPr txBox="1"/>
+          <p:nvPr/>
+        </p:nvSpPr>
+        <p:spPr>
+          <a:xfrm>
+            <a:off x="4555700" y="204016"/>
+            <a:ext cx="3168560" cy="369332"/>
+          </a:xfrm>
+          <a:prstGeom prst="rect">
+            <a:avLst/>
+          </a:prstGeom>
+          <a:noFill/>
+        </p:spPr>
+        <p:txBody>
+          <a:bodyPr wrap="none" rtlCol="0">
+            <a:spAutoFit/>
+          </a:bodyPr>
+          <a:lstStyle/>
+          <a:p>
+            <a:r>
+              <a:rPr lang="en-US" dirty="0"/>
+              <a:t>Explicitly define parameter type</a:t>
+            </a:r>
+          </a:p>
+        </p:txBody>
+      </p:sp>
+      <p:pic>
+        <p:nvPicPr>
+          <p:cNvPr id="5124" name="Picture 4" descr="http://puu.sh/of6qI/725b7369dd.png"/>
+          <p:cNvPicPr>
+            <a:picLocks noChangeAspect="1" noChangeArrowheads="1"/>
+          </p:cNvPicPr>
+          <p:nvPr/>
+        </p:nvPicPr>
+        <p:blipFill>
+          <a:blip r:embed="rId3">
+            <a:extLst>
+              <a:ext uri="{28A0092B-C50C-407E-A947-70E740481C1C}">
+                <a14:useLocalDpi xmlns:a14="http://schemas.microsoft.com/office/drawing/2010/main" val="0"/>
+              </a:ext>
+            </a:extLst>
+          </a:blip>
+          <a:srcRect/>
+          <a:stretch>
+            <a:fillRect/>
+          </a:stretch>
+        </p:blipFill>
+        <p:spPr bwMode="auto">
+          <a:xfrm>
+            <a:off x="3024999" y="5195851"/>
+            <a:ext cx="9167001" cy="1662150"/>
+          </a:xfrm>
+          <a:prstGeom prst="rect">
+            <a:avLst/>
+          </a:prstGeom>
+          <a:noFill/>
+          <a:extLst>
+            <a:ext uri="{909E8E84-426E-40DD-AFC4-6F175D3DCCD1}">
+              <a14:hiddenFill xmlns:a14="http://schemas.microsoft.com/office/drawing/2010/main">
+                <a:solidFill>
+                  <a:srgbClr val="FFFFFF"/>
+                </a:solidFill>
+              </a14:hiddenFill>
+            </a:ext>
+          </a:extLst>
+        </p:spPr>
+      </p:pic>
     </p:spTree>
     <p:extLst>
       <p:ext uri="{BB962C8B-B14F-4D97-AF65-F5344CB8AC3E}">
-        <p14:creationId xmlns:p14="http://schemas.microsoft.com/office/powerpoint/2010/main" val="3494902512"/>
+        <p14:creationId xmlns:p14="http://schemas.microsoft.com/office/powerpoint/2010/main" val="3210575785"/>
       </p:ext>
     </p:extLst>
   </p:cSld>
@@ -5219,36 +5329,9 @@
           <a:chExt cx="0" cy="0"/>
         </a:xfrm>
       </p:grpSpPr>
-      <p:sp>
-        <p:nvSpPr>
-          <p:cNvPr id="2" name="Title 1"/>
-          <p:cNvSpPr>
-            <a:spLocks noGrp="1"/>
-          </p:cNvSpPr>
-          <p:nvPr>
-            <p:ph type="title"/>
-          </p:nvPr>
-        </p:nvSpPr>
-        <p:spPr>
-          <a:xfrm>
-            <a:off x="0" y="0"/>
-            <a:ext cx="2063817" cy="591419"/>
-          </a:xfrm>
-        </p:spPr>
-        <p:txBody>
-          <a:bodyPr/>
-          <a:lstStyle/>
-          <a:p>
-            <a:r>
-              <a:rPr lang="en-US" dirty="0"/>
-              <a:t>Interfaces</a:t>
-            </a:r>
-          </a:p>
-        </p:txBody>
-      </p:sp>
       <p:pic>
         <p:nvPicPr>
-          <p:cNvPr id="8196" name="Picture 4" descr="http://puu.sh/of7yc/23bc7c3a56.png"/>
+          <p:cNvPr id="4" name="Picture 6" descr="http://puu.sh/of6Am/e88a635a99.png"/>
           <p:cNvPicPr>
             <a:picLocks noChangeAspect="1" noChangeArrowheads="1"/>
           </p:cNvPicPr>
@@ -5269,8 +5352,8 @@
         </p:blipFill>
         <p:spPr bwMode="auto">
           <a:xfrm>
-            <a:off x="0" y="846220"/>
-            <a:ext cx="6788930" cy="5735053"/>
+            <a:off x="-11033" y="2546291"/>
+            <a:ext cx="6593305" cy="1355418"/>
           </a:xfrm>
           <a:prstGeom prst="rect">
             <a:avLst/>
@@ -5287,87 +5370,60 @@
           </a:extLst>
         </p:spPr>
       </p:pic>
-      <p:cxnSp>
-        <p:nvCxnSpPr>
-          <p:cNvPr id="7" name="Straight Arrow Connector 6"/>
-          <p:cNvCxnSpPr/>
+      <p:pic>
+        <p:nvPicPr>
+          <p:cNvPr id="5" name="Picture 2" descr="http://puu.sh/of6iM/3a83f9d7dd.png"/>
+          <p:cNvPicPr>
+            <a:picLocks noChangeAspect="1" noChangeArrowheads="1"/>
+          </p:cNvPicPr>
           <p:nvPr/>
-        </p:nvCxnSpPr>
-        <p:spPr>
-          <a:xfrm flipH="1">
-            <a:off x="4102769" y="409074"/>
-            <a:ext cx="3753852" cy="553452"/>
-          </a:xfrm>
-          <a:prstGeom prst="straightConnector1">
-            <a:avLst/>
-          </a:prstGeom>
-          <a:ln>
-            <a:tailEnd type="triangle"/>
-          </a:ln>
-        </p:spPr>
-        <p:style>
-          <a:lnRef idx="1">
-            <a:schemeClr val="accent1"/>
-          </a:lnRef>
-          <a:fillRef idx="0">
-            <a:schemeClr val="accent1"/>
-          </a:fillRef>
-          <a:effectRef idx="0">
-            <a:schemeClr val="accent1"/>
-          </a:effectRef>
-          <a:fontRef idx="minor">
-            <a:schemeClr val="tx1"/>
-          </a:fontRef>
-        </p:style>
-      </p:cxnSp>
-      <p:cxnSp>
-        <p:nvCxnSpPr>
-          <p:cNvPr id="10" name="Straight Arrow Connector 9"/>
-          <p:cNvCxnSpPr/>
-          <p:nvPr/>
-        </p:nvCxnSpPr>
-        <p:spPr>
-          <a:xfrm flipH="1">
-            <a:off x="5113421" y="409074"/>
-            <a:ext cx="2743200" cy="3176337"/>
-          </a:xfrm>
-          <a:prstGeom prst="straightConnector1">
-            <a:avLst/>
-          </a:prstGeom>
-          <a:ln>
-            <a:tailEnd type="triangle"/>
-          </a:ln>
-        </p:spPr>
-        <p:style>
-          <a:lnRef idx="1">
-            <a:schemeClr val="accent1"/>
-          </a:lnRef>
-          <a:fillRef idx="0">
-            <a:schemeClr val="accent1"/>
-          </a:fillRef>
-          <a:effectRef idx="0">
-            <a:schemeClr val="accent1"/>
-          </a:effectRef>
-          <a:fontRef idx="minor">
-            <a:schemeClr val="tx1"/>
-          </a:fontRef>
-        </p:style>
-      </p:cxnSp>
-      <p:sp>
-        <p:nvSpPr>
-          <p:cNvPr id="11" name="TextBox 10"/>
-          <p:cNvSpPr txBox="1"/>
-          <p:nvPr/>
-        </p:nvSpPr>
-        <p:spPr>
-          <a:xfrm>
-            <a:off x="7856621" y="222087"/>
-            <a:ext cx="2359044" cy="369332"/>
+        </p:nvPicPr>
+        <p:blipFill rotWithShape="1">
+          <a:blip r:embed="rId3">
+            <a:extLst>
+              <a:ext uri="{28A0092B-C50C-407E-A947-70E740481C1C}">
+                <a14:useLocalDpi xmlns:a14="http://schemas.microsoft.com/office/drawing/2010/main" val="0"/>
+              </a:ext>
+            </a:extLst>
+          </a:blip>
+          <a:srcRect t="26743" r="37880" b="44067"/>
+          <a:stretch/>
+        </p:blipFill>
+        <p:spPr bwMode="auto">
+          <a:xfrm>
+            <a:off x="0" y="649705"/>
+            <a:ext cx="4985220" cy="1359569"/>
           </a:xfrm>
           <a:prstGeom prst="rect">
             <a:avLst/>
           </a:prstGeom>
           <a:noFill/>
+          <a:extLst>
+            <a:ext uri="{909E8E84-426E-40DD-AFC4-6F175D3DCCD1}">
+              <a14:hiddenFill xmlns:a14="http://schemas.microsoft.com/office/drawing/2010/main">
+                <a:solidFill>
+                  <a:srgbClr val="FFFFFF"/>
+                </a:solidFill>
+              </a14:hiddenFill>
+            </a:ext>
+          </a:extLst>
+        </p:spPr>
+      </p:pic>
+      <p:sp>
+        <p:nvSpPr>
+          <p:cNvPr id="6" name="TextBox 5"/>
+          <p:cNvSpPr txBox="1"/>
+          <p:nvPr/>
+        </p:nvSpPr>
+        <p:spPr>
+          <a:xfrm>
+            <a:off x="5137484" y="1144823"/>
+            <a:ext cx="1998239" cy="369332"/>
+          </a:xfrm>
+          <a:prstGeom prst="rect">
+            <a:avLst/>
+          </a:prstGeom>
+          <a:noFill/>
         </p:spPr>
         <p:txBody>
           <a:bodyPr wrap="none" rtlCol="0">
@@ -5377,54 +5433,21 @@
           <a:p>
             <a:r>
               <a:rPr lang="en-US" dirty="0"/>
-              <a:t>Interface declared type</a:t>
-            </a:r>
-          </a:p>
-        </p:txBody>
-      </p:sp>
-      <p:cxnSp>
-        <p:nvCxnSpPr>
-          <p:cNvPr id="13" name="Straight Arrow Connector 12"/>
-          <p:cNvCxnSpPr/>
-          <p:nvPr/>
-        </p:nvCxnSpPr>
-        <p:spPr>
-          <a:xfrm flipH="1">
-            <a:off x="5534526" y="1696453"/>
-            <a:ext cx="3260558" cy="818147"/>
-          </a:xfrm>
-          <a:prstGeom prst="straightConnector1">
-            <a:avLst/>
-          </a:prstGeom>
-          <a:ln>
-            <a:tailEnd type="triangle"/>
-          </a:ln>
-        </p:spPr>
-        <p:style>
-          <a:lnRef idx="1">
-            <a:schemeClr val="accent1"/>
-          </a:lnRef>
-          <a:fillRef idx="0">
-            <a:schemeClr val="accent1"/>
-          </a:fillRef>
-          <a:effectRef idx="0">
-            <a:schemeClr val="accent1"/>
-          </a:effectRef>
-          <a:fontRef idx="minor">
-            <a:schemeClr val="tx1"/>
-          </a:fontRef>
-        </p:style>
-      </p:cxnSp>
-      <p:sp>
-        <p:nvSpPr>
-          <p:cNvPr id="14" name="TextBox 13"/>
+              <a:t>Implicit return type</a:t>
+            </a:r>
+          </a:p>
+        </p:txBody>
+      </p:sp>
+      <p:sp>
+        <p:nvSpPr>
+          <p:cNvPr id="7" name="TextBox 6"/>
           <p:cNvSpPr txBox="1"/>
           <p:nvPr/>
         </p:nvSpPr>
         <p:spPr>
           <a:xfrm>
-            <a:off x="8867273" y="1511787"/>
-            <a:ext cx="1865191" cy="369332"/>
+            <a:off x="6689558" y="3039334"/>
+            <a:ext cx="1967783" cy="369332"/>
           </a:xfrm>
           <a:prstGeom prst="rect">
             <a:avLst/>
@@ -5439,7 +5462,91 @@
           <a:p>
             <a:r>
               <a:rPr lang="en-US" dirty="0"/>
-              <a:t>? Means optional</a:t>
+              <a:t>Explicit return type</a:t>
+            </a:r>
+          </a:p>
+        </p:txBody>
+      </p:sp>
+      <p:pic>
+        <p:nvPicPr>
+          <p:cNvPr id="6146" name="Picture 2" descr="http://puu.sh/of6GG/4fb5d40820.png"/>
+          <p:cNvPicPr>
+            <a:picLocks noChangeAspect="1" noChangeArrowheads="1"/>
+          </p:cNvPicPr>
+          <p:nvPr/>
+        </p:nvPicPr>
+        <p:blipFill>
+          <a:blip r:embed="rId4">
+            <a:extLst>
+              <a:ext uri="{28A0092B-C50C-407E-A947-70E740481C1C}">
+                <a14:useLocalDpi xmlns:a14="http://schemas.microsoft.com/office/drawing/2010/main" val="0"/>
+              </a:ext>
+            </a:extLst>
+          </a:blip>
+          <a:srcRect/>
+          <a:stretch>
+            <a:fillRect/>
+          </a:stretch>
+        </p:blipFill>
+        <p:spPr bwMode="auto">
+          <a:xfrm>
+            <a:off x="-11033" y="4438727"/>
+            <a:ext cx="6604338" cy="1408620"/>
+          </a:xfrm>
+          <a:prstGeom prst="rect">
+            <a:avLst/>
+          </a:prstGeom>
+          <a:noFill/>
+          <a:extLst>
+            <a:ext uri="{909E8E84-426E-40DD-AFC4-6F175D3DCCD1}">
+              <a14:hiddenFill xmlns:a14="http://schemas.microsoft.com/office/drawing/2010/main">
+                <a:solidFill>
+                  <a:srgbClr val="FFFFFF"/>
+                </a:solidFill>
+              </a14:hiddenFill>
+            </a:ext>
+          </a:extLst>
+        </p:spPr>
+      </p:pic>
+      <p:sp>
+        <p:nvSpPr>
+          <p:cNvPr id="9" name="TextBox 8"/>
+          <p:cNvSpPr txBox="1"/>
+          <p:nvPr/>
+        </p:nvSpPr>
+        <p:spPr>
+          <a:xfrm>
+            <a:off x="6689558" y="4933845"/>
+            <a:ext cx="4536948" cy="646331"/>
+          </a:xfrm>
+          <a:prstGeom prst="rect">
+            <a:avLst/>
+          </a:prstGeom>
+          <a:noFill/>
+        </p:spPr>
+        <p:txBody>
+          <a:bodyPr wrap="none" rtlCol="0">
+            <a:spAutoFit/>
+          </a:bodyPr>
+          <a:lstStyle/>
+          <a:p>
+            <a:r>
+              <a:rPr lang="en-US" dirty="0"/>
+              <a:t>Explicit return type as </a:t>
+            </a:r>
+            <a:r>
+              <a:rPr lang="en-US" i="1" dirty="0"/>
+              <a:t>string</a:t>
+            </a:r>
+            <a:r>
+              <a:rPr lang="en-US" dirty="0"/>
+              <a:t>, produces error</a:t>
+            </a:r>
+          </a:p>
+          <a:p>
+            <a:r>
+              <a:rPr lang="en-US" dirty="0"/>
+              <a:t>because the type being returned is not correct</a:t>
             </a:r>
           </a:p>
         </p:txBody>
@@ -5447,7 +5554,7 @@
     </p:spTree>
     <p:extLst>
       <p:ext uri="{BB962C8B-B14F-4D97-AF65-F5344CB8AC3E}">
-        <p14:creationId xmlns:p14="http://schemas.microsoft.com/office/powerpoint/2010/main" val="2363059975"/>
+        <p14:creationId xmlns:p14="http://schemas.microsoft.com/office/powerpoint/2010/main" val="3394341855"/>
       </p:ext>
     </p:extLst>
   </p:cSld>
@@ -5488,13 +5595,13 @@
       </p:grpSpPr>
       <p:pic>
         <p:nvPicPr>
-          <p:cNvPr id="9218" name="Picture 2" descr="http://puu.sh/of7Id/682c416925.png"/>
+          <p:cNvPr id="7172" name="Picture 4" descr="http://puu.sh/of72H/82cbd165e3.png"/>
           <p:cNvPicPr>
             <a:picLocks noChangeAspect="1" noChangeArrowheads="1"/>
           </p:cNvPicPr>
           <p:nvPr/>
         </p:nvPicPr>
-        <p:blipFill rotWithShape="1">
+        <p:blipFill>
           <a:blip r:embed="rId2">
             <a:extLst>
               <a:ext uri="{28A0092B-C50C-407E-A947-70E740481C1C}">
@@ -5502,13 +5609,15 @@
               </a:ext>
             </a:extLst>
           </a:blip>
-          <a:srcRect r="14223" b="27656"/>
-          <a:stretch/>
+          <a:srcRect/>
+          <a:stretch>
+            <a:fillRect/>
+          </a:stretch>
         </p:blipFill>
         <p:spPr bwMode="auto">
           <a:xfrm>
-            <a:off x="1" y="0"/>
-            <a:ext cx="5436598" cy="4391526"/>
+            <a:off x="3212432" y="1401511"/>
+            <a:ext cx="5298928" cy="3856288"/>
           </a:xfrm>
           <a:prstGeom prst="rect">
             <a:avLst/>
@@ -5525,90 +5634,10 @@
           </a:extLst>
         </p:spPr>
       </p:pic>
-      <p:pic>
-        <p:nvPicPr>
-          <p:cNvPr id="9220" name="Picture 4" descr="http://puu.sh/of7M4/396f67aa1a.png"/>
-          <p:cNvPicPr>
-            <a:picLocks noChangeAspect="1" noChangeArrowheads="1"/>
-          </p:cNvPicPr>
-          <p:nvPr/>
-        </p:nvPicPr>
-        <p:blipFill>
-          <a:blip r:embed="rId3">
-            <a:extLst>
-              <a:ext uri="{28A0092B-C50C-407E-A947-70E740481C1C}">
-                <a14:useLocalDpi xmlns:a14="http://schemas.microsoft.com/office/drawing/2010/main" val="0"/>
-              </a:ext>
-            </a:extLst>
-          </a:blip>
-          <a:srcRect/>
-          <a:stretch>
-            <a:fillRect/>
-          </a:stretch>
-        </p:blipFill>
-        <p:spPr bwMode="auto">
-          <a:xfrm>
-            <a:off x="-38805" y="4391526"/>
-            <a:ext cx="12230806" cy="2466475"/>
-          </a:xfrm>
-          <a:prstGeom prst="rect">
-            <a:avLst/>
-          </a:prstGeom>
-          <a:noFill/>
-          <a:extLst>
-            <a:ext uri="{909E8E84-426E-40DD-AFC4-6F175D3DCCD1}">
-              <a14:hiddenFill xmlns:a14="http://schemas.microsoft.com/office/drawing/2010/main">
-                <a:solidFill>
-                  <a:srgbClr val="FFFFFF"/>
-                </a:solidFill>
-              </a14:hiddenFill>
-            </a:ext>
-          </a:extLst>
-        </p:spPr>
-      </p:pic>
-      <p:pic>
-        <p:nvPicPr>
-          <p:cNvPr id="6" name="Picture 2" descr="http://puu.sh/of7Id/682c416925.png"/>
-          <p:cNvPicPr>
-            <a:picLocks noChangeAspect="1" noChangeArrowheads="1"/>
-          </p:cNvPicPr>
-          <p:nvPr/>
-        </p:nvPicPr>
-        <p:blipFill rotWithShape="1">
-          <a:blip r:embed="rId2">
-            <a:extLst>
-              <a:ext uri="{28A0092B-C50C-407E-A947-70E740481C1C}">
-                <a14:useLocalDpi xmlns:a14="http://schemas.microsoft.com/office/drawing/2010/main" val="0"/>
-              </a:ext>
-            </a:extLst>
-          </a:blip>
-          <a:srcRect t="76252"/>
-          <a:stretch/>
-        </p:blipFill>
-        <p:spPr bwMode="auto">
-          <a:xfrm>
-            <a:off x="5421105" y="2851485"/>
-            <a:ext cx="6770895" cy="1540042"/>
-          </a:xfrm>
-          <a:prstGeom prst="rect">
-            <a:avLst/>
-          </a:prstGeom>
-          <a:noFill/>
-          <a:extLst>
-            <a:ext uri="{909E8E84-426E-40DD-AFC4-6F175D3DCCD1}">
-              <a14:hiddenFill xmlns:a14="http://schemas.microsoft.com/office/drawing/2010/main">
-                <a:solidFill>
-                  <a:srgbClr val="FFFFFF"/>
-                </a:solidFill>
-              </a14:hiddenFill>
-            </a:ext>
-          </a:extLst>
-        </p:spPr>
-      </p:pic>
     </p:spTree>
     <p:extLst>
       <p:ext uri="{BB962C8B-B14F-4D97-AF65-F5344CB8AC3E}">
-        <p14:creationId xmlns:p14="http://schemas.microsoft.com/office/powerpoint/2010/main" val="3097762939"/>
+        <p14:creationId xmlns:p14="http://schemas.microsoft.com/office/powerpoint/2010/main" val="3494902512"/>
       </p:ext>
     </p:extLst>
   </p:cSld>
@@ -5647,9 +5676,36 @@
           <a:chExt cx="0" cy="0"/>
         </a:xfrm>
       </p:grpSpPr>
+      <p:sp>
+        <p:nvSpPr>
+          <p:cNvPr id="2" name="Title 1"/>
+          <p:cNvSpPr>
+            <a:spLocks noGrp="1"/>
+          </p:cNvSpPr>
+          <p:nvPr>
+            <p:ph type="title"/>
+          </p:nvPr>
+        </p:nvSpPr>
+        <p:spPr>
+          <a:xfrm>
+            <a:off x="0" y="0"/>
+            <a:ext cx="2063817" cy="591419"/>
+          </a:xfrm>
+        </p:spPr>
+        <p:txBody>
+          <a:bodyPr/>
+          <a:lstStyle/>
+          <a:p>
+            <a:r>
+              <a:rPr lang="en-US" dirty="0"/>
+              <a:t>Interfaces</a:t>
+            </a:r>
+          </a:p>
+        </p:txBody>
+      </p:sp>
       <p:pic>
         <p:nvPicPr>
-          <p:cNvPr id="10242" name="Picture 2" descr="http://puu.sh/of8lh/c0a61fe79d.png"/>
+          <p:cNvPr id="8196" name="Picture 4" descr="http://puu.sh/of7yc/23bc7c3a56.png"/>
           <p:cNvPicPr>
             <a:picLocks noChangeAspect="1" noChangeArrowheads="1"/>
           </p:cNvPicPr>
@@ -5670,8 +5726,8 @@
         </p:blipFill>
         <p:spPr bwMode="auto">
           <a:xfrm>
-            <a:off x="0" y="0"/>
-            <a:ext cx="5482074" cy="4944979"/>
+            <a:off x="0" y="846220"/>
+            <a:ext cx="6788930" cy="5735053"/>
           </a:xfrm>
           <a:prstGeom prst="rect">
             <a:avLst/>
@@ -5688,51 +5744,167 @@
           </a:extLst>
         </p:spPr>
       </p:pic>
-      <p:pic>
-        <p:nvPicPr>
-          <p:cNvPr id="10244" name="Picture 4" descr="http://puu.sh/of8nA/c902a6e49e.png"/>
-          <p:cNvPicPr>
-            <a:picLocks noChangeAspect="1" noChangeArrowheads="1"/>
-          </p:cNvPicPr>
+      <p:cxnSp>
+        <p:nvCxnSpPr>
+          <p:cNvPr id="7" name="Straight Arrow Connector 6"/>
+          <p:cNvCxnSpPr/>
           <p:nvPr/>
-        </p:nvPicPr>
-        <p:blipFill>
-          <a:blip r:embed="rId3">
-            <a:extLst>
-              <a:ext uri="{28A0092B-C50C-407E-A947-70E740481C1C}">
-                <a14:useLocalDpi xmlns:a14="http://schemas.microsoft.com/office/drawing/2010/main" val="0"/>
-              </a:ext>
-            </a:extLst>
-          </a:blip>
-          <a:srcRect/>
-          <a:stretch>
-            <a:fillRect/>
-          </a:stretch>
-        </p:blipFill>
-        <p:spPr bwMode="auto">
-          <a:xfrm>
-            <a:off x="3886200" y="4946552"/>
-            <a:ext cx="8305800" cy="1911448"/>
+        </p:nvCxnSpPr>
+        <p:spPr>
+          <a:xfrm flipH="1">
+            <a:off x="4102769" y="409074"/>
+            <a:ext cx="3753852" cy="553452"/>
+          </a:xfrm>
+          <a:prstGeom prst="straightConnector1">
+            <a:avLst/>
+          </a:prstGeom>
+          <a:ln>
+            <a:tailEnd type="triangle"/>
+          </a:ln>
+        </p:spPr>
+        <p:style>
+          <a:lnRef idx="1">
+            <a:schemeClr val="accent1"/>
+          </a:lnRef>
+          <a:fillRef idx="0">
+            <a:schemeClr val="accent1"/>
+          </a:fillRef>
+          <a:effectRef idx="0">
+            <a:schemeClr val="accent1"/>
+          </a:effectRef>
+          <a:fontRef idx="minor">
+            <a:schemeClr val="tx1"/>
+          </a:fontRef>
+        </p:style>
+      </p:cxnSp>
+      <p:cxnSp>
+        <p:nvCxnSpPr>
+          <p:cNvPr id="10" name="Straight Arrow Connector 9"/>
+          <p:cNvCxnSpPr/>
+          <p:nvPr/>
+        </p:nvCxnSpPr>
+        <p:spPr>
+          <a:xfrm flipH="1">
+            <a:off x="5113421" y="409074"/>
+            <a:ext cx="2743200" cy="3176337"/>
+          </a:xfrm>
+          <a:prstGeom prst="straightConnector1">
+            <a:avLst/>
+          </a:prstGeom>
+          <a:ln>
+            <a:tailEnd type="triangle"/>
+          </a:ln>
+        </p:spPr>
+        <p:style>
+          <a:lnRef idx="1">
+            <a:schemeClr val="accent1"/>
+          </a:lnRef>
+          <a:fillRef idx="0">
+            <a:schemeClr val="accent1"/>
+          </a:fillRef>
+          <a:effectRef idx="0">
+            <a:schemeClr val="accent1"/>
+          </a:effectRef>
+          <a:fontRef idx="minor">
+            <a:schemeClr val="tx1"/>
+          </a:fontRef>
+        </p:style>
+      </p:cxnSp>
+      <p:sp>
+        <p:nvSpPr>
+          <p:cNvPr id="11" name="TextBox 10"/>
+          <p:cNvSpPr txBox="1"/>
+          <p:nvPr/>
+        </p:nvSpPr>
+        <p:spPr>
+          <a:xfrm>
+            <a:off x="7856621" y="222087"/>
+            <a:ext cx="2359044" cy="369332"/>
           </a:xfrm>
           <a:prstGeom prst="rect">
             <a:avLst/>
           </a:prstGeom>
           <a:noFill/>
-          <a:extLst>
-            <a:ext uri="{909E8E84-426E-40DD-AFC4-6F175D3DCCD1}">
-              <a14:hiddenFill xmlns:a14="http://schemas.microsoft.com/office/drawing/2010/main">
-                <a:solidFill>
-                  <a:srgbClr val="FFFFFF"/>
-                </a:solidFill>
-              </a14:hiddenFill>
-            </a:ext>
-          </a:extLst>
-        </p:spPr>
-      </p:pic>
+        </p:spPr>
+        <p:txBody>
+          <a:bodyPr wrap="none" rtlCol="0">
+            <a:spAutoFit/>
+          </a:bodyPr>
+          <a:lstStyle/>
+          <a:p>
+            <a:r>
+              <a:rPr lang="en-US" dirty="0"/>
+              <a:t>Interface declared type</a:t>
+            </a:r>
+          </a:p>
+        </p:txBody>
+      </p:sp>
+      <p:cxnSp>
+        <p:nvCxnSpPr>
+          <p:cNvPr id="13" name="Straight Arrow Connector 12"/>
+          <p:cNvCxnSpPr/>
+          <p:nvPr/>
+        </p:nvCxnSpPr>
+        <p:spPr>
+          <a:xfrm flipH="1">
+            <a:off x="5534526" y="1696453"/>
+            <a:ext cx="3260558" cy="818147"/>
+          </a:xfrm>
+          <a:prstGeom prst="straightConnector1">
+            <a:avLst/>
+          </a:prstGeom>
+          <a:ln>
+            <a:tailEnd type="triangle"/>
+          </a:ln>
+        </p:spPr>
+        <p:style>
+          <a:lnRef idx="1">
+            <a:schemeClr val="accent1"/>
+          </a:lnRef>
+          <a:fillRef idx="0">
+            <a:schemeClr val="accent1"/>
+          </a:fillRef>
+          <a:effectRef idx="0">
+            <a:schemeClr val="accent1"/>
+          </a:effectRef>
+          <a:fontRef idx="minor">
+            <a:schemeClr val="tx1"/>
+          </a:fontRef>
+        </p:style>
+      </p:cxnSp>
+      <p:sp>
+        <p:nvSpPr>
+          <p:cNvPr id="14" name="TextBox 13"/>
+          <p:cNvSpPr txBox="1"/>
+          <p:nvPr/>
+        </p:nvSpPr>
+        <p:spPr>
+          <a:xfrm>
+            <a:off x="8867273" y="1511787"/>
+            <a:ext cx="1865191" cy="369332"/>
+          </a:xfrm>
+          <a:prstGeom prst="rect">
+            <a:avLst/>
+          </a:prstGeom>
+          <a:noFill/>
+        </p:spPr>
+        <p:txBody>
+          <a:bodyPr wrap="none" rtlCol="0">
+            <a:spAutoFit/>
+          </a:bodyPr>
+          <a:lstStyle/>
+          <a:p>
+            <a:r>
+              <a:rPr lang="en-US" dirty="0"/>
+              <a:t>? Means optional</a:t>
+            </a:r>
+          </a:p>
+        </p:txBody>
+      </p:sp>
     </p:spTree>
     <p:extLst>
       <p:ext uri="{BB962C8B-B14F-4D97-AF65-F5344CB8AC3E}">
-        <p14:creationId xmlns:p14="http://schemas.microsoft.com/office/powerpoint/2010/main" val="938054547"/>
+        <p14:creationId xmlns:p14="http://schemas.microsoft.com/office/powerpoint/2010/main" val="2363059975"/>
       </p:ext>
     </p:extLst>
   </p:cSld>
@@ -5773,13 +5945,13 @@
       </p:grpSpPr>
       <p:pic>
         <p:nvPicPr>
-          <p:cNvPr id="1026" name="Picture 2" descr="http://puu.sh/ofcNg/d319663e4b.png"/>
+          <p:cNvPr id="9218" name="Picture 2" descr="http://puu.sh/of7Id/682c416925.png"/>
           <p:cNvPicPr>
             <a:picLocks noChangeAspect="1" noChangeArrowheads="1"/>
           </p:cNvPicPr>
           <p:nvPr/>
         </p:nvPicPr>
-        <p:blipFill>
+        <p:blipFill rotWithShape="1">
           <a:blip r:embed="rId2">
             <a:extLst>
               <a:ext uri="{28A0092B-C50C-407E-A947-70E740481C1C}">
@@ -5787,15 +5959,13 @@
               </a:ext>
             </a:extLst>
           </a:blip>
-          <a:srcRect/>
-          <a:stretch>
-            <a:fillRect/>
-          </a:stretch>
+          <a:srcRect r="14223" b="27656"/>
+          <a:stretch/>
         </p:blipFill>
         <p:spPr bwMode="auto">
           <a:xfrm>
-            <a:off x="1" y="-1"/>
-            <a:ext cx="4389654" cy="6858001"/>
+            <a:off x="1" y="0"/>
+            <a:ext cx="5436598" cy="4391526"/>
           </a:xfrm>
           <a:prstGeom prst="rect">
             <a:avLst/>
@@ -5812,10 +5982,90 @@
           </a:extLst>
         </p:spPr>
       </p:pic>
+      <p:pic>
+        <p:nvPicPr>
+          <p:cNvPr id="9220" name="Picture 4" descr="http://puu.sh/of7M4/396f67aa1a.png"/>
+          <p:cNvPicPr>
+            <a:picLocks noChangeAspect="1" noChangeArrowheads="1"/>
+          </p:cNvPicPr>
+          <p:nvPr/>
+        </p:nvPicPr>
+        <p:blipFill>
+          <a:blip r:embed="rId3">
+            <a:extLst>
+              <a:ext uri="{28A0092B-C50C-407E-A947-70E740481C1C}">
+                <a14:useLocalDpi xmlns:a14="http://schemas.microsoft.com/office/drawing/2010/main" val="0"/>
+              </a:ext>
+            </a:extLst>
+          </a:blip>
+          <a:srcRect/>
+          <a:stretch>
+            <a:fillRect/>
+          </a:stretch>
+        </p:blipFill>
+        <p:spPr bwMode="auto">
+          <a:xfrm>
+            <a:off x="-38805" y="4391526"/>
+            <a:ext cx="12230806" cy="2466475"/>
+          </a:xfrm>
+          <a:prstGeom prst="rect">
+            <a:avLst/>
+          </a:prstGeom>
+          <a:noFill/>
+          <a:extLst>
+            <a:ext uri="{909E8E84-426E-40DD-AFC4-6F175D3DCCD1}">
+              <a14:hiddenFill xmlns:a14="http://schemas.microsoft.com/office/drawing/2010/main">
+                <a:solidFill>
+                  <a:srgbClr val="FFFFFF"/>
+                </a:solidFill>
+              </a14:hiddenFill>
+            </a:ext>
+          </a:extLst>
+        </p:spPr>
+      </p:pic>
+      <p:pic>
+        <p:nvPicPr>
+          <p:cNvPr id="6" name="Picture 2" descr="http://puu.sh/of7Id/682c416925.png"/>
+          <p:cNvPicPr>
+            <a:picLocks noChangeAspect="1" noChangeArrowheads="1"/>
+          </p:cNvPicPr>
+          <p:nvPr/>
+        </p:nvPicPr>
+        <p:blipFill rotWithShape="1">
+          <a:blip r:embed="rId2">
+            <a:extLst>
+              <a:ext uri="{28A0092B-C50C-407E-A947-70E740481C1C}">
+                <a14:useLocalDpi xmlns:a14="http://schemas.microsoft.com/office/drawing/2010/main" val="0"/>
+              </a:ext>
+            </a:extLst>
+          </a:blip>
+          <a:srcRect t="76252"/>
+          <a:stretch/>
+        </p:blipFill>
+        <p:spPr bwMode="auto">
+          <a:xfrm>
+            <a:off x="5421105" y="2851485"/>
+            <a:ext cx="6770895" cy="1540042"/>
+          </a:xfrm>
+          <a:prstGeom prst="rect">
+            <a:avLst/>
+          </a:prstGeom>
+          <a:noFill/>
+          <a:extLst>
+            <a:ext uri="{909E8E84-426E-40DD-AFC4-6F175D3DCCD1}">
+              <a14:hiddenFill xmlns:a14="http://schemas.microsoft.com/office/drawing/2010/main">
+                <a:solidFill>
+                  <a:srgbClr val="FFFFFF"/>
+                </a:solidFill>
+              </a14:hiddenFill>
+            </a:ext>
+          </a:extLst>
+        </p:spPr>
+      </p:pic>
     </p:spTree>
     <p:extLst>
       <p:ext uri="{BB962C8B-B14F-4D97-AF65-F5344CB8AC3E}">
-        <p14:creationId xmlns:p14="http://schemas.microsoft.com/office/powerpoint/2010/main" val="2891605965"/>
+        <p14:creationId xmlns:p14="http://schemas.microsoft.com/office/powerpoint/2010/main" val="3097762939"/>
       </p:ext>
     </p:extLst>
   </p:cSld>
@@ -5856,7 +6106,7 @@
       </p:grpSpPr>
       <p:pic>
         <p:nvPicPr>
-          <p:cNvPr id="2050" name="Picture 2" descr="http://puu.sh/ofekm/b9d65f9347.png"/>
+          <p:cNvPr id="10242" name="Picture 2" descr="http://puu.sh/of8lh/c0a61fe79d.png"/>
           <p:cNvPicPr>
             <a:picLocks noChangeAspect="1" noChangeArrowheads="1"/>
           </p:cNvPicPr>
@@ -5877,8 +6127,8 @@
         </p:blipFill>
         <p:spPr bwMode="auto">
           <a:xfrm>
-            <a:off x="1" y="0"/>
-            <a:ext cx="4098804" cy="6858000"/>
+            <a:off x="0" y="0"/>
+            <a:ext cx="5482074" cy="4944979"/>
           </a:xfrm>
           <a:prstGeom prst="rect">
             <a:avLst/>
@@ -5895,10 +6145,51 @@
           </a:extLst>
         </p:spPr>
       </p:pic>
+      <p:pic>
+        <p:nvPicPr>
+          <p:cNvPr id="10244" name="Picture 4" descr="http://puu.sh/of8nA/c902a6e49e.png"/>
+          <p:cNvPicPr>
+            <a:picLocks noChangeAspect="1" noChangeArrowheads="1"/>
+          </p:cNvPicPr>
+          <p:nvPr/>
+        </p:nvPicPr>
+        <p:blipFill>
+          <a:blip r:embed="rId3">
+            <a:extLst>
+              <a:ext uri="{28A0092B-C50C-407E-A947-70E740481C1C}">
+                <a14:useLocalDpi xmlns:a14="http://schemas.microsoft.com/office/drawing/2010/main" val="0"/>
+              </a:ext>
+            </a:extLst>
+          </a:blip>
+          <a:srcRect/>
+          <a:stretch>
+            <a:fillRect/>
+          </a:stretch>
+        </p:blipFill>
+        <p:spPr bwMode="auto">
+          <a:xfrm>
+            <a:off x="3886200" y="4946552"/>
+            <a:ext cx="8305800" cy="1911448"/>
+          </a:xfrm>
+          <a:prstGeom prst="rect">
+            <a:avLst/>
+          </a:prstGeom>
+          <a:noFill/>
+          <a:extLst>
+            <a:ext uri="{909E8E84-426E-40DD-AFC4-6F175D3DCCD1}">
+              <a14:hiddenFill xmlns:a14="http://schemas.microsoft.com/office/drawing/2010/main">
+                <a:solidFill>
+                  <a:srgbClr val="FFFFFF"/>
+                </a:solidFill>
+              </a14:hiddenFill>
+            </a:ext>
+          </a:extLst>
+        </p:spPr>
+      </p:pic>
     </p:spTree>
     <p:extLst>
       <p:ext uri="{BB962C8B-B14F-4D97-AF65-F5344CB8AC3E}">
-        <p14:creationId xmlns:p14="http://schemas.microsoft.com/office/powerpoint/2010/main" val="4006458934"/>
+        <p14:creationId xmlns:p14="http://schemas.microsoft.com/office/powerpoint/2010/main" val="938054547"/>
       </p:ext>
     </p:extLst>
   </p:cSld>
@@ -5937,38 +6228,9 @@
           <a:chExt cx="0" cy="0"/>
         </a:xfrm>
       </p:grpSpPr>
-      <p:sp>
-        <p:nvSpPr>
-          <p:cNvPr id="2" name="Title 1"/>
-          <p:cNvSpPr>
-            <a:spLocks noGrp="1"/>
-          </p:cNvSpPr>
-          <p:nvPr>
-            <p:ph type="title"/>
-          </p:nvPr>
-        </p:nvSpPr>
-        <p:spPr>
-          <a:xfrm>
-            <a:off x="0" y="0"/>
-            <a:ext cx="1582554" cy="543293"/>
-          </a:xfrm>
-        </p:spPr>
-        <p:txBody>
-          <a:bodyPr>
-            <a:normAutofit fontScale="90000"/>
-          </a:bodyPr>
-          <a:lstStyle/>
-          <a:p>
-            <a:r>
-              <a:rPr lang="en-US" dirty="0"/>
-              <a:t>Generics</a:t>
-            </a:r>
-          </a:p>
-        </p:txBody>
-      </p:sp>
       <p:pic>
         <p:nvPicPr>
-          <p:cNvPr id="11266" name="Picture 2" descr="http://puu.sh/of8Nv/c3c1fa3d2d.png"/>
+          <p:cNvPr id="1026" name="Picture 2" descr="http://puu.sh/ofcNg/d319663e4b.png"/>
           <p:cNvPicPr>
             <a:picLocks noChangeAspect="1" noChangeArrowheads="1"/>
           </p:cNvPicPr>
@@ -5989,8 +6251,8 @@
         </p:blipFill>
         <p:spPr bwMode="auto">
           <a:xfrm>
-            <a:off x="0" y="671597"/>
-            <a:ext cx="6025126" cy="4040104"/>
+            <a:off x="3729791" y="0"/>
+            <a:ext cx="4389654" cy="6858001"/>
           </a:xfrm>
           <a:prstGeom prst="rect">
             <a:avLst/>
@@ -6007,51 +6269,10 @@
           </a:extLst>
         </p:spPr>
       </p:pic>
-      <p:pic>
-        <p:nvPicPr>
-          <p:cNvPr id="5" name="Picture 4" descr="http://puu.sh/ofaet/a20aa51248.png"/>
-          <p:cNvPicPr>
-            <a:picLocks noChangeAspect="1" noChangeArrowheads="1"/>
-          </p:cNvPicPr>
-          <p:nvPr/>
-        </p:nvPicPr>
-        <p:blipFill>
-          <a:blip r:embed="rId3">
-            <a:extLst>
-              <a:ext uri="{28A0092B-C50C-407E-A947-70E740481C1C}">
-                <a14:useLocalDpi xmlns:a14="http://schemas.microsoft.com/office/drawing/2010/main" val="0"/>
-              </a:ext>
-            </a:extLst>
-          </a:blip>
-          <a:srcRect/>
-          <a:stretch>
-            <a:fillRect/>
-          </a:stretch>
-        </p:blipFill>
-        <p:spPr bwMode="auto">
-          <a:xfrm>
-            <a:off x="3316334" y="4711700"/>
-            <a:ext cx="8875666" cy="2146299"/>
-          </a:xfrm>
-          <a:prstGeom prst="rect">
-            <a:avLst/>
-          </a:prstGeom>
-          <a:noFill/>
-          <a:extLst>
-            <a:ext uri="{909E8E84-426E-40DD-AFC4-6F175D3DCCD1}">
-              <a14:hiddenFill xmlns:a14="http://schemas.microsoft.com/office/drawing/2010/main">
-                <a:solidFill>
-                  <a:srgbClr val="FFFFFF"/>
-                </a:solidFill>
-              </a14:hiddenFill>
-            </a:ext>
-          </a:extLst>
-        </p:spPr>
-      </p:pic>
     </p:spTree>
     <p:extLst>
       <p:ext uri="{BB962C8B-B14F-4D97-AF65-F5344CB8AC3E}">
-        <p14:creationId xmlns:p14="http://schemas.microsoft.com/office/powerpoint/2010/main" val="1339242354"/>
+        <p14:creationId xmlns:p14="http://schemas.microsoft.com/office/powerpoint/2010/main" val="2891605965"/>
       </p:ext>
     </p:extLst>
   </p:cSld>
@@ -6102,8 +6323,8 @@
         </p:nvSpPr>
         <p:spPr>
           <a:xfrm>
-            <a:off x="0" y="205740"/>
-            <a:ext cx="12192000" cy="4814390"/>
+            <a:off x="0" y="602784"/>
+            <a:ext cx="12192000" cy="2513397"/>
           </a:xfrm>
         </p:spPr>
         <p:txBody>
@@ -6119,10 +6340,8 @@
               <a:rPr lang="en-US" sz="14400" dirty="0">
                 <a:latin typeface="Calibri Light" panose="020F0302020204030204" pitchFamily="34" charset="0"/>
               </a:rPr>
-              <a:t>goo.gl/</a:t>
-            </a:r>
-          </a:p>
-          <a:p>
+              <a:t>goo.gl/xLJ97b</a:t>
+            </a:r>
             <a:endParaRPr lang="en-US" sz="3200" dirty="0"/>
           </a:p>
           <a:p>
@@ -6142,7 +6361,7 @@
         </p:nvSpPr>
         <p:spPr>
           <a:xfrm>
-            <a:off x="827689" y="2532359"/>
+            <a:off x="827689" y="2929403"/>
             <a:ext cx="7328095" cy="815692"/>
           </a:xfrm>
         </p:spPr>
@@ -6167,7 +6386,7 @@
         </p:nvSpPr>
         <p:spPr>
           <a:xfrm>
-            <a:off x="827689" y="3543295"/>
+            <a:off x="827689" y="3940339"/>
             <a:ext cx="12422985" cy="2729696"/>
           </a:xfrm>
           <a:prstGeom prst="rect">
@@ -6426,7 +6645,7 @@
       </p:grpSpPr>
       <p:pic>
         <p:nvPicPr>
-          <p:cNvPr id="12290" name="Picture 2" descr="http://puu.sh/ofa8s/250bbbb9a6.png"/>
+          <p:cNvPr id="2050" name="Picture 2" descr="http://puu.sh/ofekm/b9d65f9347.png"/>
           <p:cNvPicPr>
             <a:picLocks noChangeAspect="1" noChangeArrowheads="1"/>
           </p:cNvPicPr>
@@ -6447,8 +6666,8 @@
         </p:blipFill>
         <p:spPr bwMode="auto">
           <a:xfrm>
-            <a:off x="0" y="0"/>
-            <a:ext cx="7460540" cy="3670300"/>
+            <a:off x="3705728" y="0"/>
+            <a:ext cx="4098804" cy="6858000"/>
           </a:xfrm>
           <a:prstGeom prst="rect">
             <a:avLst/>
@@ -6465,51 +6684,10 @@
           </a:extLst>
         </p:spPr>
       </p:pic>
-      <p:pic>
-        <p:nvPicPr>
-          <p:cNvPr id="12294" name="Picture 6" descr="http://puu.sh/ofalx/f2f93c7284.png"/>
-          <p:cNvPicPr>
-            <a:picLocks noChangeAspect="1" noChangeArrowheads="1"/>
-          </p:cNvPicPr>
-          <p:nvPr/>
-        </p:nvPicPr>
-        <p:blipFill>
-          <a:blip r:embed="rId3">
-            <a:extLst>
-              <a:ext uri="{28A0092B-C50C-407E-A947-70E740481C1C}">
-                <a14:useLocalDpi xmlns:a14="http://schemas.microsoft.com/office/drawing/2010/main" val="0"/>
-              </a:ext>
-            </a:extLst>
-          </a:blip>
-          <a:srcRect/>
-          <a:stretch>
-            <a:fillRect/>
-          </a:stretch>
-        </p:blipFill>
-        <p:spPr bwMode="auto">
-          <a:xfrm>
-            <a:off x="0" y="5924003"/>
-            <a:ext cx="12192001" cy="933997"/>
-          </a:xfrm>
-          <a:prstGeom prst="rect">
-            <a:avLst/>
-          </a:prstGeom>
-          <a:noFill/>
-          <a:extLst>
-            <a:ext uri="{909E8E84-426E-40DD-AFC4-6F175D3DCCD1}">
-              <a14:hiddenFill xmlns:a14="http://schemas.microsoft.com/office/drawing/2010/main">
-                <a:solidFill>
-                  <a:srgbClr val="FFFFFF"/>
-                </a:solidFill>
-              </a14:hiddenFill>
-            </a:ext>
-          </a:extLst>
-        </p:spPr>
-      </p:pic>
     </p:spTree>
     <p:extLst>
       <p:ext uri="{BB962C8B-B14F-4D97-AF65-F5344CB8AC3E}">
-        <p14:creationId xmlns:p14="http://schemas.microsoft.com/office/powerpoint/2010/main" val="2982211604"/>
+        <p14:creationId xmlns:p14="http://schemas.microsoft.com/office/powerpoint/2010/main" val="4006458934"/>
       </p:ext>
     </p:extLst>
   </p:cSld>
@@ -6548,9 +6726,38 @@
           <a:chExt cx="0" cy="0"/>
         </a:xfrm>
       </p:grpSpPr>
+      <p:sp>
+        <p:nvSpPr>
+          <p:cNvPr id="2" name="Title 1"/>
+          <p:cNvSpPr>
+            <a:spLocks noGrp="1"/>
+          </p:cNvSpPr>
+          <p:nvPr>
+            <p:ph type="title"/>
+          </p:nvPr>
+        </p:nvSpPr>
+        <p:spPr>
+          <a:xfrm>
+            <a:off x="0" y="0"/>
+            <a:ext cx="1582554" cy="543293"/>
+          </a:xfrm>
+        </p:spPr>
+        <p:txBody>
+          <a:bodyPr>
+            <a:normAutofit fontScale="90000"/>
+          </a:bodyPr>
+          <a:lstStyle/>
+          <a:p>
+            <a:r>
+              <a:rPr lang="en-US" dirty="0"/>
+              <a:t>Generics</a:t>
+            </a:r>
+          </a:p>
+        </p:txBody>
+      </p:sp>
       <p:pic>
         <p:nvPicPr>
-          <p:cNvPr id="13314" name="Picture 2" descr="http://puu.sh/ofbF3/9fc2f748da.png"/>
+          <p:cNvPr id="11266" name="Picture 2" descr="http://puu.sh/of8Nv/c3c1fa3d2d.png"/>
           <p:cNvPicPr>
             <a:picLocks noChangeAspect="1" noChangeArrowheads="1"/>
           </p:cNvPicPr>
@@ -6571,8 +6778,8 @@
         </p:blipFill>
         <p:spPr bwMode="auto">
           <a:xfrm>
-            <a:off x="-1" y="0"/>
-            <a:ext cx="6150999" cy="4235116"/>
+            <a:off x="0" y="671597"/>
+            <a:ext cx="6025126" cy="4040104"/>
           </a:xfrm>
           <a:prstGeom prst="rect">
             <a:avLst/>
@@ -6591,7 +6798,7 @@
       </p:pic>
       <p:pic>
         <p:nvPicPr>
-          <p:cNvPr id="13316" name="Picture 4" descr="http://puu.sh/ofc0X/2b4ce0f30a.png"/>
+          <p:cNvPr id="5" name="Picture 4" descr="http://puu.sh/ofaet/a20aa51248.png"/>
           <p:cNvPicPr>
             <a:picLocks noChangeAspect="1" noChangeArrowheads="1"/>
           </p:cNvPicPr>
@@ -6612,8 +6819,8 @@
         </p:blipFill>
         <p:spPr bwMode="auto">
           <a:xfrm>
-            <a:off x="6352674" y="3399321"/>
-            <a:ext cx="5839327" cy="3458680"/>
+            <a:off x="3316334" y="4711700"/>
+            <a:ext cx="8875666" cy="2146299"/>
           </a:xfrm>
           <a:prstGeom prst="rect">
             <a:avLst/>
@@ -6630,39 +6837,10 @@
           </a:extLst>
         </p:spPr>
       </p:pic>
-      <p:sp>
-        <p:nvSpPr>
-          <p:cNvPr id="4" name="TextBox 3"/>
-          <p:cNvSpPr txBox="1"/>
-          <p:nvPr/>
-        </p:nvSpPr>
-        <p:spPr>
-          <a:xfrm>
-            <a:off x="6352674" y="3029989"/>
-            <a:ext cx="2321213" cy="369332"/>
-          </a:xfrm>
-          <a:prstGeom prst="rect">
-            <a:avLst/>
-          </a:prstGeom>
-          <a:noFill/>
-        </p:spPr>
-        <p:txBody>
-          <a:bodyPr wrap="none" rtlCol="0">
-            <a:spAutoFit/>
-          </a:bodyPr>
-          <a:lstStyle/>
-          <a:p>
-            <a:r>
-              <a:rPr lang="en-US" dirty="0"/>
-              <a:t>Indexer using generics:</a:t>
-            </a:r>
-          </a:p>
-        </p:txBody>
-      </p:sp>
     </p:spTree>
     <p:extLst>
       <p:ext uri="{BB962C8B-B14F-4D97-AF65-F5344CB8AC3E}">
-        <p14:creationId xmlns:p14="http://schemas.microsoft.com/office/powerpoint/2010/main" val="1445063290"/>
+        <p14:creationId xmlns:p14="http://schemas.microsoft.com/office/powerpoint/2010/main" val="1339242354"/>
       </p:ext>
     </p:extLst>
   </p:cSld>
@@ -6703,7 +6881,7 @@
       </p:grpSpPr>
       <p:pic>
         <p:nvPicPr>
-          <p:cNvPr id="3074" name="Picture 2" descr="http://puu.sh/offk0/dd75af7ed2.png"/>
+          <p:cNvPr id="12290" name="Picture 2" descr="http://puu.sh/ofa8s/250bbbb9a6.png"/>
           <p:cNvPicPr>
             <a:picLocks noChangeAspect="1" noChangeArrowheads="1"/>
           </p:cNvPicPr>
@@ -6725,7 +6903,7 @@
         <p:spPr bwMode="auto">
           <a:xfrm>
             <a:off x="0" y="0"/>
-            <a:ext cx="10286710" cy="5378116"/>
+            <a:ext cx="7460540" cy="3670300"/>
           </a:xfrm>
           <a:prstGeom prst="rect">
             <a:avLst/>
@@ -6742,10 +6920,51 @@
           </a:extLst>
         </p:spPr>
       </p:pic>
+      <p:pic>
+        <p:nvPicPr>
+          <p:cNvPr id="12294" name="Picture 6" descr="http://puu.sh/ofalx/f2f93c7284.png"/>
+          <p:cNvPicPr>
+            <a:picLocks noChangeAspect="1" noChangeArrowheads="1"/>
+          </p:cNvPicPr>
+          <p:nvPr/>
+        </p:nvPicPr>
+        <p:blipFill>
+          <a:blip r:embed="rId3">
+            <a:extLst>
+              <a:ext uri="{28A0092B-C50C-407E-A947-70E740481C1C}">
+                <a14:useLocalDpi xmlns:a14="http://schemas.microsoft.com/office/drawing/2010/main" val="0"/>
+              </a:ext>
+            </a:extLst>
+          </a:blip>
+          <a:srcRect/>
+          <a:stretch>
+            <a:fillRect/>
+          </a:stretch>
+        </p:blipFill>
+        <p:spPr bwMode="auto">
+          <a:xfrm>
+            <a:off x="0" y="5924003"/>
+            <a:ext cx="12192001" cy="933997"/>
+          </a:xfrm>
+          <a:prstGeom prst="rect">
+            <a:avLst/>
+          </a:prstGeom>
+          <a:noFill/>
+          <a:extLst>
+            <a:ext uri="{909E8E84-426E-40DD-AFC4-6F175D3DCCD1}">
+              <a14:hiddenFill xmlns:a14="http://schemas.microsoft.com/office/drawing/2010/main">
+                <a:solidFill>
+                  <a:srgbClr val="FFFFFF"/>
+                </a:solidFill>
+              </a14:hiddenFill>
+            </a:ext>
+          </a:extLst>
+        </p:spPr>
+      </p:pic>
     </p:spTree>
     <p:extLst>
       <p:ext uri="{BB962C8B-B14F-4D97-AF65-F5344CB8AC3E}">
-        <p14:creationId xmlns:p14="http://schemas.microsoft.com/office/powerpoint/2010/main" val="4248984478"/>
+        <p14:creationId xmlns:p14="http://schemas.microsoft.com/office/powerpoint/2010/main" val="2982211604"/>
       </p:ext>
     </p:extLst>
   </p:cSld>
@@ -6786,7 +7005,7 @@
       </p:grpSpPr>
       <p:pic>
         <p:nvPicPr>
-          <p:cNvPr id="4098" name="Picture 2" descr="http://puu.sh/offou/36aa1aaceb.png"/>
+          <p:cNvPr id="13314" name="Picture 2" descr="http://puu.sh/ofbF3/9fc2f748da.png"/>
           <p:cNvPicPr>
             <a:picLocks noChangeAspect="1" noChangeArrowheads="1"/>
           </p:cNvPicPr>
@@ -6807,8 +7026,8 @@
         </p:blipFill>
         <p:spPr bwMode="auto">
           <a:xfrm>
-            <a:off x="0" y="0"/>
-            <a:ext cx="6710690" cy="6858000"/>
+            <a:off x="-1" y="0"/>
+            <a:ext cx="6150999" cy="4235116"/>
           </a:xfrm>
           <a:prstGeom prst="rect">
             <a:avLst/>
@@ -6825,10 +7044,80 @@
           </a:extLst>
         </p:spPr>
       </p:pic>
+      <p:pic>
+        <p:nvPicPr>
+          <p:cNvPr id="13316" name="Picture 4" descr="http://puu.sh/ofc0X/2b4ce0f30a.png"/>
+          <p:cNvPicPr>
+            <a:picLocks noChangeAspect="1" noChangeArrowheads="1"/>
+          </p:cNvPicPr>
+          <p:nvPr/>
+        </p:nvPicPr>
+        <p:blipFill>
+          <a:blip r:embed="rId3">
+            <a:extLst>
+              <a:ext uri="{28A0092B-C50C-407E-A947-70E740481C1C}">
+                <a14:useLocalDpi xmlns:a14="http://schemas.microsoft.com/office/drawing/2010/main" val="0"/>
+              </a:ext>
+            </a:extLst>
+          </a:blip>
+          <a:srcRect/>
+          <a:stretch>
+            <a:fillRect/>
+          </a:stretch>
+        </p:blipFill>
+        <p:spPr bwMode="auto">
+          <a:xfrm>
+            <a:off x="6352674" y="3399321"/>
+            <a:ext cx="5839327" cy="3458680"/>
+          </a:xfrm>
+          <a:prstGeom prst="rect">
+            <a:avLst/>
+          </a:prstGeom>
+          <a:noFill/>
+          <a:extLst>
+            <a:ext uri="{909E8E84-426E-40DD-AFC4-6F175D3DCCD1}">
+              <a14:hiddenFill xmlns:a14="http://schemas.microsoft.com/office/drawing/2010/main">
+                <a:solidFill>
+                  <a:srgbClr val="FFFFFF"/>
+                </a:solidFill>
+              </a14:hiddenFill>
+            </a:ext>
+          </a:extLst>
+        </p:spPr>
+      </p:pic>
+      <p:sp>
+        <p:nvSpPr>
+          <p:cNvPr id="4" name="TextBox 3"/>
+          <p:cNvSpPr txBox="1"/>
+          <p:nvPr/>
+        </p:nvSpPr>
+        <p:spPr>
+          <a:xfrm>
+            <a:off x="6352674" y="3029989"/>
+            <a:ext cx="2321213" cy="369332"/>
+          </a:xfrm>
+          <a:prstGeom prst="rect">
+            <a:avLst/>
+          </a:prstGeom>
+          <a:noFill/>
+        </p:spPr>
+        <p:txBody>
+          <a:bodyPr wrap="none" rtlCol="0">
+            <a:spAutoFit/>
+          </a:bodyPr>
+          <a:lstStyle/>
+          <a:p>
+            <a:r>
+              <a:rPr lang="en-US" dirty="0"/>
+              <a:t>Indexer using generics:</a:t>
+            </a:r>
+          </a:p>
+        </p:txBody>
+      </p:sp>
     </p:spTree>
     <p:extLst>
       <p:ext uri="{BB962C8B-B14F-4D97-AF65-F5344CB8AC3E}">
-        <p14:creationId xmlns:p14="http://schemas.microsoft.com/office/powerpoint/2010/main" val="938900498"/>
+        <p14:creationId xmlns:p14="http://schemas.microsoft.com/office/powerpoint/2010/main" val="1445063290"/>
       </p:ext>
     </p:extLst>
   </p:cSld>
@@ -6867,6 +7156,172 @@
           <a:chExt cx="0" cy="0"/>
         </a:xfrm>
       </p:grpSpPr>
+      <p:pic>
+        <p:nvPicPr>
+          <p:cNvPr id="3074" name="Picture 2" descr="http://puu.sh/offk0/dd75af7ed2.png"/>
+          <p:cNvPicPr>
+            <a:picLocks noChangeAspect="1" noChangeArrowheads="1"/>
+          </p:cNvPicPr>
+          <p:nvPr/>
+        </p:nvPicPr>
+        <p:blipFill>
+          <a:blip r:embed="rId2">
+            <a:extLst>
+              <a:ext uri="{28A0092B-C50C-407E-A947-70E740481C1C}">
+                <a14:useLocalDpi xmlns:a14="http://schemas.microsoft.com/office/drawing/2010/main" val="0"/>
+              </a:ext>
+            </a:extLst>
+          </a:blip>
+          <a:srcRect/>
+          <a:stretch>
+            <a:fillRect/>
+          </a:stretch>
+        </p:blipFill>
+        <p:spPr bwMode="auto">
+          <a:xfrm>
+            <a:off x="0" y="0"/>
+            <a:ext cx="10286710" cy="5378116"/>
+          </a:xfrm>
+          <a:prstGeom prst="rect">
+            <a:avLst/>
+          </a:prstGeom>
+          <a:noFill/>
+          <a:extLst>
+            <a:ext uri="{909E8E84-426E-40DD-AFC4-6F175D3DCCD1}">
+              <a14:hiddenFill xmlns:a14="http://schemas.microsoft.com/office/drawing/2010/main">
+                <a:solidFill>
+                  <a:srgbClr val="FFFFFF"/>
+                </a:solidFill>
+              </a14:hiddenFill>
+            </a:ext>
+          </a:extLst>
+        </p:spPr>
+      </p:pic>
+    </p:spTree>
+    <p:extLst>
+      <p:ext uri="{BB962C8B-B14F-4D97-AF65-F5344CB8AC3E}">
+        <p14:creationId xmlns:p14="http://schemas.microsoft.com/office/powerpoint/2010/main" val="4248984478"/>
+      </p:ext>
+    </p:extLst>
+  </p:cSld>
+  <p:clrMapOvr>
+    <a:masterClrMapping/>
+  </p:clrMapOvr>
+  <mc:AlternateContent xmlns:mc="http://schemas.openxmlformats.org/markup-compatibility/2006" xmlns:p14="http://schemas.microsoft.com/office/powerpoint/2010/main">
+    <mc:Choice Requires="p14">
+      <p:transition spd="med" p14:dur="700">
+        <p:fade/>
+      </p:transition>
+    </mc:Choice>
+    <mc:Fallback xmlns="">
+      <p:transition spd="med">
+        <p:fade/>
+      </p:transition>
+    </mc:Fallback>
+  </mc:AlternateContent>
+</p:sld>
+</file>
+
+<file path=ppt/slides/slide25.xml><?xml version="1.0" encoding="utf-8"?>
+<p:sld xmlns:a="http://schemas.openxmlformats.org/drawingml/2006/main" xmlns:r="http://schemas.openxmlformats.org/officeDocument/2006/relationships" xmlns:p="http://schemas.openxmlformats.org/presentationml/2006/main">
+  <p:cSld>
+    <p:spTree>
+      <p:nvGrpSpPr>
+        <p:cNvPr id="1" name=""/>
+        <p:cNvGrpSpPr/>
+        <p:nvPr/>
+      </p:nvGrpSpPr>
+      <p:grpSpPr>
+        <a:xfrm>
+          <a:off x="0" y="0"/>
+          <a:ext cx="0" cy="0"/>
+          <a:chOff x="0" y="0"/>
+          <a:chExt cx="0" cy="0"/>
+        </a:xfrm>
+      </p:grpSpPr>
+      <p:pic>
+        <p:nvPicPr>
+          <p:cNvPr id="4098" name="Picture 2" descr="http://puu.sh/offou/36aa1aaceb.png"/>
+          <p:cNvPicPr>
+            <a:picLocks noChangeAspect="1" noChangeArrowheads="1"/>
+          </p:cNvPicPr>
+          <p:nvPr/>
+        </p:nvPicPr>
+        <p:blipFill>
+          <a:blip r:embed="rId2">
+            <a:extLst>
+              <a:ext uri="{28A0092B-C50C-407E-A947-70E740481C1C}">
+                <a14:useLocalDpi xmlns:a14="http://schemas.microsoft.com/office/drawing/2010/main" val="0"/>
+              </a:ext>
+            </a:extLst>
+          </a:blip>
+          <a:srcRect/>
+          <a:stretch>
+            <a:fillRect/>
+          </a:stretch>
+        </p:blipFill>
+        <p:spPr bwMode="auto">
+          <a:xfrm>
+            <a:off x="0" y="0"/>
+            <a:ext cx="6710690" cy="6858000"/>
+          </a:xfrm>
+          <a:prstGeom prst="rect">
+            <a:avLst/>
+          </a:prstGeom>
+          <a:noFill/>
+          <a:extLst>
+            <a:ext uri="{909E8E84-426E-40DD-AFC4-6F175D3DCCD1}">
+              <a14:hiddenFill xmlns:a14="http://schemas.microsoft.com/office/drawing/2010/main">
+                <a:solidFill>
+                  <a:srgbClr val="FFFFFF"/>
+                </a:solidFill>
+              </a14:hiddenFill>
+            </a:ext>
+          </a:extLst>
+        </p:spPr>
+      </p:pic>
+    </p:spTree>
+    <p:extLst>
+      <p:ext uri="{BB962C8B-B14F-4D97-AF65-F5344CB8AC3E}">
+        <p14:creationId xmlns:p14="http://schemas.microsoft.com/office/powerpoint/2010/main" val="938900498"/>
+      </p:ext>
+    </p:extLst>
+  </p:cSld>
+  <p:clrMapOvr>
+    <a:masterClrMapping/>
+  </p:clrMapOvr>
+  <mc:AlternateContent xmlns:mc="http://schemas.openxmlformats.org/markup-compatibility/2006" xmlns:p14="http://schemas.microsoft.com/office/powerpoint/2010/main">
+    <mc:Choice Requires="p14">
+      <p:transition spd="med" p14:dur="700">
+        <p:fade/>
+      </p:transition>
+    </mc:Choice>
+    <mc:Fallback xmlns="">
+      <p:transition spd="med">
+        <p:fade/>
+      </p:transition>
+    </mc:Fallback>
+  </mc:AlternateContent>
+</p:sld>
+</file>
+
+<file path=ppt/slides/slide26.xml><?xml version="1.0" encoding="utf-8"?>
+<p:sld xmlns:a="http://schemas.openxmlformats.org/drawingml/2006/main" xmlns:r="http://schemas.openxmlformats.org/officeDocument/2006/relationships" xmlns:p="http://schemas.openxmlformats.org/presentationml/2006/main">
+  <p:cSld>
+    <p:spTree>
+      <p:nvGrpSpPr>
+        <p:cNvPr id="1" name=""/>
+        <p:cNvGrpSpPr/>
+        <p:nvPr/>
+      </p:nvGrpSpPr>
+      <p:grpSpPr>
+        <a:xfrm>
+          <a:off x="0" y="0"/>
+          <a:ext cx="0" cy="0"/>
+          <a:chOff x="0" y="0"/>
+          <a:chExt cx="0" cy="0"/>
+        </a:xfrm>
+      </p:grpSpPr>
       <p:sp>
         <p:nvSpPr>
           <p:cNvPr id="2" name="Title 1"/>
@@ -6877,7 +7332,12 @@
             <p:ph type="title"/>
           </p:nvPr>
         </p:nvSpPr>
-        <p:spPr/>
+        <p:spPr>
+          <a:xfrm>
+            <a:off x="1341120" y="467360"/>
+            <a:ext cx="9509760" cy="675640"/>
+          </a:xfrm>
+        </p:spPr>
         <p:txBody>
           <a:bodyPr/>
           <a:lstStyle/>
@@ -6899,7 +7359,12 @@
             <p:ph idx="1"/>
           </p:nvPr>
         </p:nvSpPr>
-        <p:spPr/>
+        <p:spPr>
+          <a:xfrm>
+            <a:off x="1341120" y="1299412"/>
+            <a:ext cx="9509760" cy="4730168"/>
+          </a:xfrm>
+        </p:spPr>
         <p:txBody>
           <a:bodyPr/>
           <a:lstStyle/>
@@ -6921,26 +7386,6 @@
             <a:r>
               <a:rPr lang="en-US" dirty="0"/>
               <a:t>Build a product prototype (web app, mobile, other…)</a:t>
-            </a:r>
-          </a:p>
-          <a:p>
-            <a:r>
-              <a:rPr lang="en-US" dirty="0"/>
-              <a:t>It’s A LOT of fun!</a:t>
-            </a:r>
-          </a:p>
-          <a:p>
-            <a:r>
-              <a:rPr lang="en-US" dirty="0"/>
-              <a:t>Looks </a:t>
-            </a:r>
-            <a:r>
-              <a:rPr lang="en-US" u="sng" dirty="0"/>
-              <a:t>great</a:t>
-            </a:r>
-            <a:r>
-              <a:rPr lang="en-US" dirty="0"/>
-              <a:t> on resume</a:t>
             </a:r>
           </a:p>
           <a:p>
@@ -6984,8 +7429,8 @@
         </p:blipFill>
         <p:spPr bwMode="auto">
           <a:xfrm>
-            <a:off x="7000599" y="4505948"/>
-            <a:ext cx="5191401" cy="2076560"/>
+            <a:off x="3766808" y="3487924"/>
+            <a:ext cx="8425192" cy="3370076"/>
           </a:xfrm>
           <a:prstGeom prst="rect">
             <a:avLst/>
@@ -7027,7 +7472,7 @@
 </p:sld>
 </file>
 
-<file path=ppt/slides/slide25.xml><?xml version="1.0" encoding="utf-8"?>
+<file path=ppt/slides/slide27.xml><?xml version="1.0" encoding="utf-8"?>
 <p:sld xmlns:a="http://schemas.openxmlformats.org/drawingml/2006/main" xmlns:r="http://schemas.openxmlformats.org/officeDocument/2006/relationships" xmlns:p="http://schemas.openxmlformats.org/presentationml/2006/main">
   <p:cSld>
     <p:spTree>
@@ -7125,7 +7570,12 @@
             <p:ph type="title"/>
           </p:nvPr>
         </p:nvSpPr>
-        <p:spPr/>
+        <p:spPr>
+          <a:xfrm>
+            <a:off x="1341120" y="467360"/>
+            <a:ext cx="9509760" cy="1144872"/>
+          </a:xfrm>
+        </p:spPr>
         <p:txBody>
           <a:bodyPr/>
           <a:lstStyle/>
@@ -7152,50 +7602,65 @@
             <p:ph idx="1"/>
           </p:nvPr>
         </p:nvSpPr>
-        <p:spPr/>
-        <p:txBody>
-          <a:bodyPr/>
+        <p:spPr>
+          <a:xfrm>
+            <a:off x="1341120" y="2081462"/>
+            <a:ext cx="9509760" cy="4439653"/>
+          </a:xfrm>
+        </p:spPr>
+        <p:txBody>
+          <a:bodyPr>
+            <a:normAutofit/>
+          </a:bodyPr>
           <a:lstStyle/>
           <a:p>
             <a:r>
-              <a:rPr lang="en-US" sz="3600" dirty="0"/>
+              <a:rPr lang="en-US" sz="3200" dirty="0"/>
               <a:t>SDE Intern</a:t>
             </a:r>
           </a:p>
           <a:p>
             <a:pPr lvl="1"/>
             <a:r>
+              <a:rPr lang="en-US" sz="2800" dirty="0"/>
+              <a:t>bit.ly/1Y9KzkU</a:t>
+            </a:r>
+          </a:p>
+          <a:p>
+            <a:r>
               <a:rPr lang="en-US" sz="3200" dirty="0"/>
-              <a:t>bit.ly/1Y9KzkU</a:t>
-            </a:r>
-          </a:p>
-          <a:p>
-            <a:r>
-              <a:rPr lang="en-US" sz="3600" dirty="0"/>
               <a:t>Explorer Intern</a:t>
             </a:r>
           </a:p>
           <a:p>
             <a:pPr lvl="1"/>
             <a:r>
-              <a:rPr lang="en-US" sz="3400" dirty="0"/>
+              <a:rPr lang="en-US" sz="3200" dirty="0"/>
               <a:t>Freshman / Sophomore </a:t>
             </a:r>
           </a:p>
           <a:p>
             <a:pPr lvl="1"/>
             <a:r>
-              <a:rPr lang="en-US" sz="3400" dirty="0"/>
+              <a:rPr lang="en-US" sz="3200" dirty="0"/>
               <a:t>Rotate between SDE / PM</a:t>
             </a:r>
           </a:p>
           <a:p>
             <a:pPr lvl="1"/>
             <a:r>
+              <a:rPr lang="en-US" sz="2800" dirty="0"/>
+              <a:t>bit.ly/1lbcL9L</a:t>
+            </a:r>
+          </a:p>
+          <a:p>
+            <a:r>
               <a:rPr lang="en-US" sz="3200" dirty="0"/>
-              <a:t>bit.ly/1lbcL9L</a:t>
-            </a:r>
-            <a:endParaRPr lang="en-US" dirty="0"/>
+              <a:t>Questions? (ask now or stay after)</a:t>
+            </a:r>
+          </a:p>
+          <a:p>
+            <a:endParaRPr lang="en-US" sz="3200" dirty="0"/>
           </a:p>
         </p:txBody>
       </p:sp>
@@ -7221,7 +7686,7 @@
         </p:blipFill>
         <p:spPr>
           <a:xfrm>
-            <a:off x="1341120" y="850393"/>
+            <a:off x="1341120" y="761841"/>
             <a:ext cx="3985846" cy="850391"/>
           </a:xfrm>
           <a:prstGeom prst="rect">
@@ -7363,6 +7828,15 @@
               <a:t>Sign up now!!</a:t>
             </a:r>
           </a:p>
+          <a:p>
+            <a:r>
+              <a:rPr lang="en-US" dirty="0">
+                <a:hlinkClick r:id="rId3"/>
+              </a:rPr>
+              <a:t>Video</a:t>
+            </a:r>
+            <a:endParaRPr lang="en-US" dirty="0"/>
+          </a:p>
         </p:txBody>
       </p:sp>
       <p:pic>
@@ -7374,7 +7848,7 @@
           <p:nvPr/>
         </p:nvPicPr>
         <p:blipFill>
-          <a:blip r:embed="rId3">
+          <a:blip r:embed="rId4">
             <a:extLst>
               <a:ext uri="{28A0092B-C50C-407E-A947-70E740481C1C}">
                 <a14:useLocalDpi xmlns:a14="http://schemas.microsoft.com/office/drawing/2010/main" val="0"/>
@@ -7388,7 +7862,7 @@
         </p:blipFill>
         <p:spPr bwMode="auto">
           <a:xfrm>
-            <a:off x="7000599" y="4505948"/>
+            <a:off x="7000599" y="4781440"/>
             <a:ext cx="5191401" cy="2076560"/>
           </a:xfrm>
           <a:prstGeom prst="rect">
@@ -7460,52 +7934,211 @@
         </p:nvSpPr>
         <p:spPr>
           <a:xfrm>
-            <a:off x="0" y="3741821"/>
-            <a:ext cx="12192000" cy="2194079"/>
+            <a:off x="0" y="0"/>
+            <a:ext cx="9509760" cy="627514"/>
+          </a:xfrm>
+        </p:spPr>
+        <p:txBody>
+          <a:bodyPr/>
+          <a:lstStyle/>
+          <a:p>
+            <a:r>
+              <a:rPr lang="en-US" dirty="0"/>
+              <a:t>Prizes</a:t>
+            </a:r>
+          </a:p>
+        </p:txBody>
+      </p:sp>
+      <p:sp>
+        <p:nvSpPr>
+          <p:cNvPr id="3" name="Content Placeholder 2"/>
+          <p:cNvSpPr>
+            <a:spLocks noGrp="1"/>
+          </p:cNvSpPr>
+          <p:nvPr>
+            <p:ph idx="1"/>
+          </p:nvPr>
+        </p:nvSpPr>
+        <p:spPr>
+          <a:xfrm>
+            <a:off x="1341120" y="493296"/>
+            <a:ext cx="9509760" cy="6100010"/>
           </a:xfrm>
         </p:spPr>
         <p:txBody>
           <a:bodyPr>
-            <a:noAutofit/>
+            <a:normAutofit/>
           </a:bodyPr>
           <a:lstStyle/>
           <a:p>
-            <a:pPr algn="ctr"/>
-            <a:r>
-              <a:rPr lang="en-US" sz="13800" dirty="0"/>
-              <a:t>goo.gl/</a:t>
-            </a:r>
-            <a:r>
-              <a:rPr lang="en-US" sz="13800" dirty="0" err="1"/>
-              <a:t>mPVVPb</a:t>
-            </a:r>
-            <a:endParaRPr lang="en-US" sz="13800" dirty="0"/>
+            <a:r>
+              <a:rPr lang="en-US" b="1" dirty="0"/>
+              <a:t>1</a:t>
+            </a:r>
+            <a:r>
+              <a:rPr lang="en-US" b="1" baseline="30000" dirty="0"/>
+              <a:t>st</a:t>
+            </a:r>
+            <a:r>
+              <a:rPr lang="en-US" b="1" dirty="0"/>
+              <a:t> Place</a:t>
+            </a:r>
+          </a:p>
+          <a:p>
+            <a:pPr lvl="1"/>
+            <a:r>
+              <a:rPr lang="en-US" dirty="0"/>
+              <a:t>Friend level co-working space for 3 months at The Edge (Summer 2016)</a:t>
+            </a:r>
+          </a:p>
+          <a:p>
+            <a:pPr lvl="1"/>
+            <a:r>
+              <a:rPr lang="en-US" dirty="0"/>
+              <a:t>Two hours of Legal consultation with Rosen Harwood</a:t>
+            </a:r>
+          </a:p>
+          <a:p>
+            <a:pPr lvl="1"/>
+            <a:r>
+              <a:rPr lang="en-US" dirty="0"/>
+              <a:t>Two hours of Accounting consultation with </a:t>
+            </a:r>
+            <a:r>
+              <a:rPr lang="en-US" dirty="0" err="1"/>
+              <a:t>JamisonMoneyFarmer</a:t>
+            </a:r>
+            <a:r>
+              <a:rPr lang="en-US" dirty="0"/>
+              <a:t> PC (JMF)</a:t>
+            </a:r>
+          </a:p>
+          <a:p>
+            <a:pPr lvl="1"/>
+            <a:r>
+              <a:rPr lang="en-US" dirty="0"/>
+              <a:t>Free .CO domain registration</a:t>
+            </a:r>
+          </a:p>
+          <a:p>
+            <a:pPr lvl="1"/>
+            <a:r>
+              <a:rPr lang="en-US" dirty="0"/>
+              <a:t>$300 in credits from Google Cloud Platform to help build web and mobile apps</a:t>
+            </a:r>
+          </a:p>
+          <a:p>
+            <a:r>
+              <a:rPr lang="en-US" dirty="0"/>
+              <a:t>2</a:t>
+            </a:r>
+            <a:r>
+              <a:rPr lang="en-US" baseline="30000" dirty="0"/>
+              <a:t>nd</a:t>
+            </a:r>
+            <a:r>
+              <a:rPr lang="en-US" dirty="0"/>
+              <a:t> Place</a:t>
+            </a:r>
+          </a:p>
+          <a:p>
+            <a:pPr lvl="1"/>
+            <a:r>
+              <a:rPr lang="en-US" dirty="0"/>
+              <a:t>Friend level co-working space for 3 months at The Edge (Summer 2016)</a:t>
+            </a:r>
+          </a:p>
+          <a:p>
+            <a:pPr lvl="1"/>
+            <a:r>
+              <a:rPr lang="en-US" dirty="0"/>
+              <a:t>One hour of Legal consulting with Rosen Harwood</a:t>
+            </a:r>
+          </a:p>
+          <a:p>
+            <a:pPr lvl="1"/>
+            <a:r>
+              <a:rPr lang="en-US" dirty="0"/>
+              <a:t>One hour of Accounting consulting with </a:t>
+            </a:r>
+            <a:r>
+              <a:rPr lang="en-US" dirty="0" err="1"/>
+              <a:t>JamisonMoneyFarmer</a:t>
+            </a:r>
+            <a:r>
+              <a:rPr lang="en-US" dirty="0"/>
+              <a:t> PC (JMF)</a:t>
+            </a:r>
+          </a:p>
+          <a:p>
+            <a:pPr lvl="1"/>
+            <a:r>
+              <a:rPr lang="en-US" dirty="0"/>
+              <a:t>Free .CO domain registration</a:t>
+            </a:r>
+          </a:p>
+          <a:p>
+            <a:pPr lvl="1"/>
+            <a:r>
+              <a:rPr lang="en-US" dirty="0"/>
+              <a:t>$300 in credits from Google Cloud Platform to help build web and mobile apps</a:t>
+            </a:r>
+          </a:p>
+          <a:p>
+            <a:r>
+              <a:rPr lang="en-US" dirty="0"/>
+              <a:t>3</a:t>
+            </a:r>
+            <a:r>
+              <a:rPr lang="en-US" baseline="30000" dirty="0"/>
+              <a:t>rd</a:t>
+            </a:r>
+            <a:r>
+              <a:rPr lang="en-US" dirty="0"/>
+              <a:t> Place</a:t>
+            </a:r>
+          </a:p>
+          <a:p>
+            <a:pPr lvl="1"/>
+            <a:r>
+              <a:rPr lang="en-US" dirty="0"/>
+              <a:t>Free .CO domain registration</a:t>
+            </a:r>
+          </a:p>
+          <a:p>
+            <a:pPr lvl="1"/>
+            <a:r>
+              <a:rPr lang="en-US" dirty="0"/>
+              <a:t>$300 in credits from Google Cloud Platform to help build web and mobile apps</a:t>
+            </a:r>
           </a:p>
         </p:txBody>
       </p:sp>
       <p:pic>
         <p:nvPicPr>
-          <p:cNvPr id="7170" name="Picture 2" descr="http://thatstechnology.com/wp-content/uploads/2015/03/0328-Slack-Logo.jpg"/>
+          <p:cNvPr id="2052" name="Picture 4" descr="https://scontent-atl3-1.xx.fbcdn.net/hphotos-xat1/v/t1.0-9/12670859_733137026787519_7030742083454077300_n.png?oh=e11fa31b6860c4ac8579a51ddbae0c19&amp;oe=57593369"/>
           <p:cNvPicPr>
             <a:picLocks noChangeAspect="1" noChangeArrowheads="1"/>
           </p:cNvPicPr>
           <p:nvPr/>
         </p:nvPicPr>
-        <p:blipFill rotWithShape="1">
-          <a:blip r:embed="rId2">
+        <p:blipFill>
+          <a:blip r:embed="rId2" cstate="print">
             <a:extLst>
               <a:ext uri="{28A0092B-C50C-407E-A947-70E740481C1C}">
                 <a14:useLocalDpi xmlns:a14="http://schemas.microsoft.com/office/drawing/2010/main" val="0"/>
               </a:ext>
             </a:extLst>
           </a:blip>
-          <a:srcRect l="8222" t="25263" r="8252" b="24421"/>
-          <a:stretch/>
+          <a:srcRect/>
+          <a:stretch>
+            <a:fillRect/>
+          </a:stretch>
         </p:blipFill>
         <p:spPr bwMode="auto">
           <a:xfrm>
-            <a:off x="2757714" y="0"/>
-            <a:ext cx="6604380" cy="2983832"/>
+            <a:off x="9733547" y="0"/>
+            <a:ext cx="2458453" cy="983381"/>
           </a:xfrm>
           <a:prstGeom prst="rect">
             <a:avLst/>
@@ -7525,7 +8158,7 @@
     </p:spTree>
     <p:extLst>
       <p:ext uri="{BB962C8B-B14F-4D97-AF65-F5344CB8AC3E}">
-        <p14:creationId xmlns:p14="http://schemas.microsoft.com/office/powerpoint/2010/main" val="1192122821"/>
+        <p14:creationId xmlns:p14="http://schemas.microsoft.com/office/powerpoint/2010/main" val="1439998910"/>
       </p:ext>
     </p:extLst>
   </p:cSld>
@@ -7574,133 +8207,40 @@
             <p:ph type="title"/>
           </p:nvPr>
         </p:nvSpPr>
-        <p:spPr/>
-        <p:txBody>
-          <a:bodyPr/>
-          <a:lstStyle/>
-          <a:p>
-            <a:r>
-              <a:rPr lang="en-US" dirty="0"/>
-              <a:t>What is                           ?</a:t>
-            </a:r>
-          </a:p>
-        </p:txBody>
-      </p:sp>
-      <p:sp>
-        <p:nvSpPr>
-          <p:cNvPr id="3" name="Content Placeholder 2"/>
-          <p:cNvSpPr>
-            <a:spLocks noGrp="1"/>
-          </p:cNvSpPr>
-          <p:nvPr>
-            <p:ph idx="1"/>
-          </p:nvPr>
-        </p:nvSpPr>
-        <p:spPr/>
+        <p:spPr>
+          <a:xfrm>
+            <a:off x="0" y="3741821"/>
+            <a:ext cx="12192000" cy="2194079"/>
+          </a:xfrm>
+        </p:spPr>
         <p:txBody>
           <a:bodyPr>
-            <a:normAutofit/>
+            <a:noAutofit/>
           </a:bodyPr>
           <a:lstStyle/>
           <a:p>
-            <a:r>
-              <a:rPr lang="en-US" dirty="0"/>
-              <a:t>Superset of JavaScript</a:t>
-            </a:r>
-          </a:p>
-          <a:p>
-            <a:pPr lvl="1"/>
-            <a:r>
-              <a:rPr lang="en-US" dirty="0"/>
-              <a:t>Any JavaScript is TypeScript</a:t>
-            </a:r>
-          </a:p>
-          <a:p>
-            <a:pPr lvl="1"/>
-            <a:r>
-              <a:rPr lang="en-US" dirty="0"/>
-              <a:t>Has more language features than JavaScript</a:t>
-            </a:r>
-          </a:p>
-          <a:p>
-            <a:pPr lvl="1"/>
-            <a:r>
-              <a:rPr lang="en-US" dirty="0"/>
-              <a:t>Compiled / </a:t>
-            </a:r>
-            <a:r>
-              <a:rPr lang="en-US" dirty="0" err="1"/>
-              <a:t>Transpiled</a:t>
-            </a:r>
-            <a:endParaRPr lang="en-US" dirty="0"/>
-          </a:p>
-          <a:p>
-            <a:pPr lvl="2"/>
-            <a:r>
-              <a:rPr lang="en-US" dirty="0"/>
-              <a:t>To JavaScript</a:t>
-            </a:r>
-          </a:p>
-          <a:p>
-            <a:r>
-              <a:rPr lang="en-US" dirty="0"/>
-              <a:t>Extra features</a:t>
-            </a:r>
-          </a:p>
-          <a:p>
-            <a:pPr lvl="1"/>
-            <a:r>
-              <a:rPr lang="en-US" dirty="0"/>
-              <a:t>Types!</a:t>
-            </a:r>
-          </a:p>
-          <a:p>
-            <a:pPr lvl="2"/>
-            <a:r>
-              <a:rPr lang="en-US" dirty="0"/>
-              <a:t>Including generic types</a:t>
-            </a:r>
-          </a:p>
-          <a:p>
-            <a:pPr lvl="1"/>
-            <a:r>
-              <a:rPr lang="en-US" dirty="0"/>
-              <a:t>Interfaces + Abstract Classes</a:t>
-            </a:r>
-          </a:p>
-          <a:p>
-            <a:pPr lvl="1"/>
-            <a:r>
-              <a:rPr lang="en-US" dirty="0"/>
-              <a:t>Async / Await in ES6</a:t>
-            </a:r>
-          </a:p>
-          <a:p>
-            <a:pPr lvl="2"/>
-            <a:r>
-              <a:rPr lang="en-US" dirty="0"/>
-              <a:t>Easier way to handle Promises</a:t>
-            </a:r>
-          </a:p>
-          <a:p>
-            <a:pPr lvl="2"/>
-            <a:endParaRPr lang="en-US" dirty="0"/>
-          </a:p>
-          <a:p>
-            <a:pPr lvl="1"/>
-            <a:endParaRPr lang="en-US" dirty="0"/>
+            <a:pPr algn="ctr"/>
+            <a:r>
+              <a:rPr lang="en-US" sz="13800" dirty="0"/>
+              <a:t>goo.gl/</a:t>
+            </a:r>
+            <a:r>
+              <a:rPr lang="en-US" sz="13800" dirty="0" err="1"/>
+              <a:t>mPVVPb</a:t>
+            </a:r>
+            <a:endParaRPr lang="en-US" sz="13800" dirty="0"/>
           </a:p>
         </p:txBody>
       </p:sp>
       <p:pic>
         <p:nvPicPr>
-          <p:cNvPr id="1028" name="Picture 4" descr="https://upload.wikimedia.org/wikipedia/commons/a/a6/TypeScript_Logo.png"/>
+          <p:cNvPr id="7170" name="Picture 2" descr="http://thatstechnology.com/wp-content/uploads/2015/03/0328-Slack-Logo.jpg"/>
           <p:cNvPicPr>
             <a:picLocks noChangeAspect="1" noChangeArrowheads="1"/>
           </p:cNvPicPr>
           <p:nvPr/>
         </p:nvPicPr>
-        <p:blipFill>
+        <p:blipFill rotWithShape="1">
           <a:blip r:embed="rId2">
             <a:extLst>
               <a:ext uri="{28A0092B-C50C-407E-A947-70E740481C1C}">
@@ -7708,15 +8248,13 @@
               </a:ext>
             </a:extLst>
           </a:blip>
-          <a:srcRect/>
-          <a:stretch>
-            <a:fillRect/>
-          </a:stretch>
+          <a:srcRect l="8222" t="25263" r="8252" b="24421"/>
+          <a:stretch/>
         </p:blipFill>
         <p:spPr bwMode="auto">
           <a:xfrm>
-            <a:off x="2869468" y="1119758"/>
-            <a:ext cx="2381250" cy="581026"/>
+            <a:off x="2757714" y="0"/>
+            <a:ext cx="6604380" cy="2983832"/>
           </a:xfrm>
           <a:prstGeom prst="rect">
             <a:avLst/>
@@ -7736,7 +8274,7 @@
     </p:spTree>
     <p:extLst>
       <p:ext uri="{BB962C8B-B14F-4D97-AF65-F5344CB8AC3E}">
-        <p14:creationId xmlns:p14="http://schemas.microsoft.com/office/powerpoint/2010/main" val="1911210661"/>
+        <p14:creationId xmlns:p14="http://schemas.microsoft.com/office/powerpoint/2010/main" val="1192122821"/>
       </p:ext>
     </p:extLst>
   </p:cSld>
@@ -7791,8 +8329,12 @@
           <a:lstStyle/>
           <a:p>
             <a:r>
+              <a:rPr lang="en-US" dirty="0" err="1"/>
+              <a:t>VSCode</a:t>
+            </a:r>
+            <a:r>
               <a:rPr lang="en-US" dirty="0"/>
-              <a:t>Why use                          ?</a:t>
+              <a:t> (Visual Studio Code)</a:t>
             </a:r>
           </a:p>
         </p:txBody>
@@ -7812,145 +8354,29 @@
           <a:bodyPr/>
           <a:lstStyle/>
           <a:p>
-            <a:pPr lvl="1"/>
             <a:r>
               <a:rPr lang="en-US" dirty="0"/>
-              <a:t>Types</a:t>
-            </a:r>
-          </a:p>
-          <a:p>
-            <a:pPr lvl="2"/>
+              <a:t>Not Visual Studio</a:t>
+            </a:r>
+          </a:p>
+          <a:p>
             <a:r>
               <a:rPr lang="en-US" dirty="0"/>
-              <a:t>Eliminates type errors (which are super common in JavaScript)</a:t>
-            </a:r>
-          </a:p>
-          <a:p>
-            <a:pPr lvl="1"/>
+              <a:t>Takes about 1 minute to install</a:t>
+            </a:r>
+          </a:p>
+          <a:p>
             <a:r>
               <a:rPr lang="en-US" dirty="0"/>
-              <a:t>Allow large projects</a:t>
-            </a:r>
-          </a:p>
-          <a:p>
-            <a:pPr lvl="1"/>
-            <a:r>
-              <a:rPr lang="en-US" dirty="0"/>
-              <a:t>Allow large teams</a:t>
-            </a:r>
-          </a:p>
-          <a:p>
-            <a:pPr lvl="1"/>
-            <a:r>
-              <a:rPr lang="en-US" dirty="0"/>
-              <a:t>Reduces need for type documentation</a:t>
-            </a:r>
-          </a:p>
-          <a:p>
-            <a:pPr lvl="1"/>
-            <a:r>
-              <a:rPr lang="en-US" dirty="0"/>
-              <a:t>Reduces need for cross developer communication</a:t>
-            </a:r>
-          </a:p>
-          <a:p>
-            <a:pPr lvl="1"/>
-            <a:r>
-              <a:rPr lang="en-US" dirty="0"/>
-              <a:t>The flexibility of JavaScript with type safety</a:t>
-            </a:r>
-          </a:p>
-          <a:p>
-            <a:pPr lvl="1"/>
-            <a:r>
-              <a:rPr lang="en-US" dirty="0"/>
-              <a:t>Freedom to target specific ECMAScript versions</a:t>
-            </a:r>
-          </a:p>
-          <a:p>
-            <a:pPr lvl="2"/>
-            <a:r>
-              <a:rPr lang="en-US" dirty="0"/>
-              <a:t>ES3 / ES5 / ES6 / ES2016 (ES7)</a:t>
-            </a:r>
-          </a:p>
-          <a:p>
-            <a:pPr lvl="1"/>
-            <a:r>
-              <a:rPr lang="en-US" dirty="0"/>
-              <a:t>Freedom to target specific module systems</a:t>
-            </a:r>
-          </a:p>
-          <a:p>
-            <a:pPr lvl="2"/>
-            <a:r>
-              <a:rPr lang="en-US" dirty="0" err="1"/>
-              <a:t>CommonJS</a:t>
-            </a:r>
-            <a:r>
-              <a:rPr lang="en-US" dirty="0"/>
-              <a:t> / AMD / UMD / </a:t>
-            </a:r>
-            <a:r>
-              <a:rPr lang="en-US" dirty="0" err="1"/>
-              <a:t>ect</a:t>
-            </a:r>
-            <a:r>
-              <a:rPr lang="en-US" dirty="0"/>
-              <a:t>…</a:t>
-            </a:r>
-          </a:p>
-          <a:p>
-            <a:pPr lvl="1"/>
-            <a:endParaRPr lang="en-US" dirty="0"/>
-          </a:p>
-        </p:txBody>
-      </p:sp>
-      <p:pic>
-        <p:nvPicPr>
-          <p:cNvPr id="1028" name="Picture 4" descr="https://upload.wikimedia.org/wikipedia/commons/a/a6/TypeScript_Logo.png"/>
-          <p:cNvPicPr>
-            <a:picLocks noChangeAspect="1" noChangeArrowheads="1"/>
-          </p:cNvPicPr>
-          <p:nvPr/>
-        </p:nvPicPr>
-        <p:blipFill>
-          <a:blip r:embed="rId2">
-            <a:extLst>
-              <a:ext uri="{28A0092B-C50C-407E-A947-70E740481C1C}">
-                <a14:useLocalDpi xmlns:a14="http://schemas.microsoft.com/office/drawing/2010/main" val="0"/>
-              </a:ext>
-            </a:extLst>
-          </a:blip>
-          <a:srcRect/>
-          <a:stretch>
-            <a:fillRect/>
-          </a:stretch>
-        </p:blipFill>
-        <p:spPr bwMode="auto">
-          <a:xfrm>
-            <a:off x="2998426" y="1119758"/>
-            <a:ext cx="2381250" cy="581026"/>
-          </a:xfrm>
-          <a:prstGeom prst="rect">
-            <a:avLst/>
-          </a:prstGeom>
-          <a:noFill/>
-          <a:extLst>
-            <a:ext uri="{909E8E84-426E-40DD-AFC4-6F175D3DCCD1}">
-              <a14:hiddenFill xmlns:a14="http://schemas.microsoft.com/office/drawing/2010/main">
-                <a:solidFill>
-                  <a:srgbClr val="FFFFFF"/>
-                </a:solidFill>
-              </a14:hiddenFill>
-            </a:ext>
-          </a:extLst>
-        </p:spPr>
-      </p:pic>
+              <a:t>code.visualstudio.com</a:t>
+            </a:r>
+          </a:p>
+        </p:txBody>
+      </p:sp>
     </p:spTree>
     <p:extLst>
       <p:ext uri="{BB962C8B-B14F-4D97-AF65-F5344CB8AC3E}">
-        <p14:creationId xmlns:p14="http://schemas.microsoft.com/office/powerpoint/2010/main" val="601310991"/>
+        <p14:creationId xmlns:p14="http://schemas.microsoft.com/office/powerpoint/2010/main" val="597842758"/>
       </p:ext>
     </p:extLst>
   </p:cSld>
@@ -8006,14 +8432,120 @@
           <a:p>
             <a:r>
               <a:rPr lang="en-US" dirty="0"/>
-              <a:t>Who uses                          ? </a:t>
-            </a:r>
+              <a:t>What is                           ?</a:t>
+            </a:r>
+          </a:p>
+        </p:txBody>
+      </p:sp>
+      <p:sp>
+        <p:nvSpPr>
+          <p:cNvPr id="3" name="Content Placeholder 2"/>
+          <p:cNvSpPr>
+            <a:spLocks noGrp="1"/>
+          </p:cNvSpPr>
+          <p:nvPr>
+            <p:ph idx="1"/>
+          </p:nvPr>
+        </p:nvSpPr>
+        <p:spPr/>
+        <p:txBody>
+          <a:bodyPr>
+            <a:normAutofit/>
+          </a:bodyPr>
+          <a:lstStyle/>
+          <a:p>
+            <a:r>
+              <a:rPr lang="en-US" dirty="0"/>
+              <a:t>Superset of JavaScript</a:t>
+            </a:r>
+          </a:p>
+          <a:p>
+            <a:pPr lvl="1"/>
+            <a:r>
+              <a:rPr lang="en-US" dirty="0"/>
+              <a:t>Any JavaScript is TypeScript</a:t>
+            </a:r>
+          </a:p>
+          <a:p>
+            <a:pPr lvl="1"/>
+            <a:r>
+              <a:rPr lang="en-US" dirty="0"/>
+              <a:t>Has more language features than JavaScript</a:t>
+            </a:r>
+          </a:p>
+          <a:p>
+            <a:pPr lvl="1"/>
+            <a:r>
+              <a:rPr lang="en-US" dirty="0"/>
+              <a:t>Compiled / </a:t>
+            </a:r>
+            <a:r>
+              <a:rPr lang="en-US" dirty="0" err="1"/>
+              <a:t>Transpiled</a:t>
+            </a:r>
+            <a:endParaRPr lang="en-US" dirty="0"/>
+          </a:p>
+          <a:p>
+            <a:pPr lvl="2"/>
+            <a:r>
+              <a:rPr lang="en-US" dirty="0"/>
+              <a:t>To JavaScript</a:t>
+            </a:r>
+          </a:p>
+          <a:p>
+            <a:r>
+              <a:rPr lang="en-US" dirty="0"/>
+              <a:t>Extra features</a:t>
+            </a:r>
+          </a:p>
+          <a:p>
+            <a:pPr lvl="1"/>
+            <a:r>
+              <a:rPr lang="en-US" dirty="0"/>
+              <a:t>Types!</a:t>
+            </a:r>
+          </a:p>
+          <a:p>
+            <a:pPr lvl="2"/>
+            <a:r>
+              <a:rPr lang="en-US" dirty="0"/>
+              <a:t>Including generic types</a:t>
+            </a:r>
+          </a:p>
+          <a:p>
+            <a:pPr lvl="1"/>
+            <a:r>
+              <a:rPr lang="en-US" dirty="0"/>
+              <a:t>Interfaces + Abstract Classes</a:t>
+            </a:r>
+          </a:p>
+          <a:p>
+            <a:pPr lvl="1"/>
+            <a:r>
+              <a:rPr lang="en-US" dirty="0"/>
+              <a:t>Async / Await in ES6</a:t>
+            </a:r>
+          </a:p>
+          <a:p>
+            <a:pPr lvl="2"/>
+            <a:r>
+              <a:rPr lang="en-US" dirty="0"/>
+              <a:t>Easier way to handle Promises</a:t>
+            </a:r>
+          </a:p>
+          <a:p>
+            <a:pPr lvl="2"/>
+            <a:endParaRPr lang="en-US" dirty="0"/>
+          </a:p>
+          <a:p>
+            <a:pPr lvl="1"/>
+            <a:endParaRPr lang="en-US" dirty="0"/>
           </a:p>
         </p:txBody>
       </p:sp>
       <p:pic>
         <p:nvPicPr>
-          <p:cNvPr id="4" name="Picture 4" descr="https://upload.wikimedia.org/wikipedia/commons/a/a6/TypeScript_Logo.png"/>
+          <p:cNvPr id="1028" name="Picture 4" descr="https://upload.wikimedia.org/wikipedia/commons/a/a6/TypeScript_Logo.png"/>
           <p:cNvPicPr>
             <a:picLocks noChangeAspect="1" noChangeArrowheads="1"/>
           </p:cNvPicPr>
@@ -8034,7 +8566,7 @@
         </p:blipFill>
         <p:spPr bwMode="auto">
           <a:xfrm>
-            <a:off x="3168411" y="1119758"/>
+            <a:off x="2869468" y="1119758"/>
             <a:ext cx="2381250" cy="581026"/>
           </a:xfrm>
           <a:prstGeom prst="rect">
@@ -8052,124 +8584,10 @@
           </a:extLst>
         </p:spPr>
       </p:pic>
-      <p:pic>
-        <p:nvPicPr>
-          <p:cNvPr id="2050" name="Picture 2" descr="http://levelup.lishman.com/images/angular2.png"/>
-          <p:cNvPicPr>
-            <a:picLocks noGrp="1" noChangeAspect="1" noChangeArrowheads="1"/>
-          </p:cNvPicPr>
-          <p:nvPr>
-            <p:ph idx="1"/>
-          </p:nvPr>
-        </p:nvPicPr>
-        <p:blipFill>
-          <a:blip r:embed="rId3">
-            <a:extLst>
-              <a:ext uri="{28A0092B-C50C-407E-A947-70E740481C1C}">
-                <a14:useLocalDpi xmlns:a14="http://schemas.microsoft.com/office/drawing/2010/main" val="0"/>
-              </a:ext>
-            </a:extLst>
-          </a:blip>
-          <a:srcRect/>
-          <a:stretch>
-            <a:fillRect/>
-          </a:stretch>
-        </p:blipFill>
-        <p:spPr bwMode="auto">
-          <a:xfrm>
-            <a:off x="1559801" y="2353182"/>
-            <a:ext cx="2835447" cy="2998910"/>
-          </a:xfrm>
-          <a:prstGeom prst="rect">
-            <a:avLst/>
-          </a:prstGeom>
-          <a:noFill/>
-          <a:extLst>
-            <a:ext uri="{909E8E84-426E-40DD-AFC4-6F175D3DCCD1}">
-              <a14:hiddenFill xmlns:a14="http://schemas.microsoft.com/office/drawing/2010/main">
-                <a:solidFill>
-                  <a:srgbClr val="FFFFFF"/>
-                </a:solidFill>
-              </a14:hiddenFill>
-            </a:ext>
-          </a:extLst>
-        </p:spPr>
-      </p:pic>
-      <p:pic>
-        <p:nvPicPr>
-          <p:cNvPr id="2052" name="Picture 4" descr="http://res.cloudinary.com/demo/image/fetch/fl_png8/https:/www.google.com/images/branding/googlelogo/2x/googlelogo_color_272x92dp.png"/>
-          <p:cNvPicPr>
-            <a:picLocks noChangeAspect="1" noChangeArrowheads="1"/>
-          </p:cNvPicPr>
-          <p:nvPr/>
-        </p:nvPicPr>
-        <p:blipFill>
-          <a:blip r:embed="rId4">
-            <a:extLst>
-              <a:ext uri="{28A0092B-C50C-407E-A947-70E740481C1C}">
-                <a14:useLocalDpi xmlns:a14="http://schemas.microsoft.com/office/drawing/2010/main" val="0"/>
-              </a:ext>
-            </a:extLst>
-          </a:blip>
-          <a:srcRect/>
-          <a:stretch>
-            <a:fillRect/>
-          </a:stretch>
-        </p:blipFill>
-        <p:spPr bwMode="auto">
-          <a:xfrm>
-            <a:off x="6311290" y="2581796"/>
-            <a:ext cx="3215298" cy="1087527"/>
-          </a:xfrm>
-          <a:prstGeom prst="rect">
-            <a:avLst/>
-          </a:prstGeom>
-          <a:noFill/>
-          <a:extLst>
-            <a:ext uri="{909E8E84-426E-40DD-AFC4-6F175D3DCCD1}">
-              <a14:hiddenFill xmlns:a14="http://schemas.microsoft.com/office/drawing/2010/main">
-                <a:solidFill>
-                  <a:srgbClr val="FFFFFF"/>
-                </a:solidFill>
-              </a14:hiddenFill>
-            </a:ext>
-          </a:extLst>
-        </p:spPr>
-      </p:pic>
-      <p:pic>
-        <p:nvPicPr>
-          <p:cNvPr id="5" name="Picture 4"/>
-          <p:cNvPicPr>
-            <a:picLocks noChangeAspect="1"/>
-          </p:cNvPicPr>
-          <p:nvPr/>
-        </p:nvPicPr>
-        <p:blipFill>
-          <a:blip r:embed="rId5" cstate="print">
-            <a:extLst>
-              <a:ext uri="{28A0092B-C50C-407E-A947-70E740481C1C}">
-                <a14:useLocalDpi xmlns:a14="http://schemas.microsoft.com/office/drawing/2010/main" val="0"/>
-              </a:ext>
-            </a:extLst>
-          </a:blip>
-          <a:stretch>
-            <a:fillRect/>
-          </a:stretch>
-        </p:blipFill>
-        <p:spPr>
-          <a:xfrm>
-            <a:off x="5926016" y="4447775"/>
-            <a:ext cx="3985846" cy="850391"/>
-          </a:xfrm>
-          <a:prstGeom prst="rect">
-            <a:avLst/>
-          </a:prstGeom>
-        </p:spPr>
-      </p:pic>
     </p:spTree>
     <p:extLst>
       <p:ext uri="{BB962C8B-B14F-4D97-AF65-F5344CB8AC3E}">
-        <p14:creationId xmlns:p14="http://schemas.microsoft.com/office/powerpoint/2010/main" val="1671910564"/>
+        <p14:creationId xmlns:p14="http://schemas.microsoft.com/office/powerpoint/2010/main" val="1911210661"/>
       </p:ext>
     </p:extLst>
   </p:cSld>
@@ -8210,6 +8628,28 @@
       </p:grpSpPr>
       <p:sp>
         <p:nvSpPr>
+          <p:cNvPr id="2" name="Title 1"/>
+          <p:cNvSpPr>
+            <a:spLocks noGrp="1"/>
+          </p:cNvSpPr>
+          <p:nvPr>
+            <p:ph type="title"/>
+          </p:nvPr>
+        </p:nvSpPr>
+        <p:spPr/>
+        <p:txBody>
+          <a:bodyPr/>
+          <a:lstStyle/>
+          <a:p>
+            <a:r>
+              <a:rPr lang="en-US" dirty="0"/>
+              <a:t>Why use                          ?</a:t>
+            </a:r>
+          </a:p>
+        </p:txBody>
+      </p:sp>
+      <p:sp>
+        <p:nvSpPr>
           <p:cNvPr id="3" name="Content Placeholder 2"/>
           <p:cNvSpPr>
             <a:spLocks noGrp="1"/>
@@ -8218,192 +8658,150 @@
             <p:ph idx="1"/>
           </p:nvPr>
         </p:nvSpPr>
-        <p:spPr>
-          <a:xfrm>
-            <a:off x="1341120" y="216568"/>
-            <a:ext cx="9509760" cy="5813011"/>
-          </a:xfrm>
-        </p:spPr>
+        <p:spPr/>
         <p:txBody>
           <a:bodyPr/>
           <a:lstStyle/>
           <a:p>
-            <a:pPr marL="45720" indent="0" algn="ctr">
-              <a:buNone/>
-            </a:pPr>
-            <a:r>
-              <a:rPr lang="en-US" sz="3200" dirty="0">
-                <a:latin typeface="Consolas" panose="020B0609020204030204" pitchFamily="49" charset="0"/>
-              </a:rPr>
-              <a:t>Open </a:t>
-            </a:r>
-            <a:r>
-              <a:rPr lang="en-US" sz="3200" dirty="0" err="1">
-                <a:latin typeface="Consolas" panose="020B0609020204030204" pitchFamily="49" charset="0"/>
-              </a:rPr>
-              <a:t>git</a:t>
-            </a:r>
-            <a:r>
-              <a:rPr lang="en-US" sz="3200" dirty="0">
-                <a:latin typeface="Consolas" panose="020B0609020204030204" pitchFamily="49" charset="0"/>
-              </a:rPr>
-              <a:t> bash or terminal</a:t>
-            </a:r>
-          </a:p>
-          <a:p>
-            <a:pPr marL="45720" indent="0" algn="ctr">
-              <a:buNone/>
-            </a:pPr>
-            <a:endParaRPr lang="en-US" dirty="0">
-              <a:latin typeface="Consolas" panose="020B0609020204030204" pitchFamily="49" charset="0"/>
-            </a:endParaRPr>
-          </a:p>
-          <a:p>
-            <a:pPr marL="45720" indent="0">
-              <a:buNone/>
-            </a:pPr>
-            <a:r>
-              <a:rPr lang="en-US" sz="2400" dirty="0" err="1">
-                <a:latin typeface="Consolas" panose="020B0609020204030204" pitchFamily="49" charset="0"/>
-              </a:rPr>
-              <a:t>git</a:t>
-            </a:r>
-            <a:r>
-              <a:rPr lang="en-US" sz="2400" dirty="0">
-                <a:latin typeface="Consolas" panose="020B0609020204030204" pitchFamily="49" charset="0"/>
-              </a:rPr>
-              <a:t> clone https://github.com/chcaru/workshop.git</a:t>
-            </a:r>
-          </a:p>
-          <a:p>
-            <a:pPr marL="45720" indent="0">
-              <a:buNone/>
-            </a:pPr>
-            <a:r>
-              <a:rPr lang="en-US" sz="2400" dirty="0">
-                <a:latin typeface="Consolas" panose="020B0609020204030204" pitchFamily="49" charset="0"/>
-              </a:rPr>
-              <a:t>cd workshop/typescript/start</a:t>
-            </a:r>
-          </a:p>
-          <a:p>
-            <a:pPr marL="45720" indent="0">
-              <a:buNone/>
-            </a:pPr>
-            <a:r>
-              <a:rPr lang="en-US" sz="2400" dirty="0" err="1">
-                <a:latin typeface="Consolas" panose="020B0609020204030204" pitchFamily="49" charset="0"/>
-              </a:rPr>
-              <a:t>npm</a:t>
-            </a:r>
-            <a:r>
-              <a:rPr lang="en-US" sz="2400" dirty="0">
-                <a:latin typeface="Consolas" panose="020B0609020204030204" pitchFamily="49" charset="0"/>
-              </a:rPr>
-              <a:t> install –g typescript</a:t>
-            </a:r>
-          </a:p>
-          <a:p>
-            <a:pPr marL="45720" indent="0">
-              <a:buNone/>
-            </a:pPr>
-            <a:r>
-              <a:rPr lang="en-US" sz="2400" dirty="0" err="1">
-                <a:latin typeface="Consolas" panose="020B0609020204030204" pitchFamily="49" charset="0"/>
-              </a:rPr>
-              <a:t>tsc</a:t>
-            </a:r>
-            <a:r>
-              <a:rPr lang="en-US" sz="2400" dirty="0">
-                <a:latin typeface="Consolas" panose="020B0609020204030204" pitchFamily="49" charset="0"/>
-              </a:rPr>
-              <a:t> –w –pretty </a:t>
-            </a:r>
-          </a:p>
-          <a:p>
-            <a:pPr marL="45720" indent="0">
-              <a:buNone/>
-            </a:pPr>
-            <a:r>
-              <a:rPr lang="en-US" sz="2400" dirty="0">
-                <a:latin typeface="Consolas" panose="020B0609020204030204" pitchFamily="49" charset="0"/>
-              </a:rPr>
-              <a:t>start code .</a:t>
-            </a:r>
-          </a:p>
-          <a:p>
-            <a:pPr marL="45720" indent="0">
-              <a:buNone/>
-            </a:pPr>
-            <a:endParaRPr lang="en-US" sz="2400" dirty="0">
-              <a:latin typeface="Consolas" panose="020B0609020204030204" pitchFamily="49" charset="0"/>
-            </a:endParaRPr>
-          </a:p>
-          <a:p>
-            <a:pPr marL="45720" indent="0">
-              <a:buNone/>
-            </a:pPr>
-            <a:r>
-              <a:rPr lang="en-US" sz="2400" dirty="0">
+            <a:pPr lvl="1"/>
+            <a:r>
+              <a:rPr lang="en-US" dirty="0"/>
+              <a:t>Types</a:t>
+            </a:r>
+          </a:p>
+          <a:p>
+            <a:pPr lvl="2"/>
+            <a:r>
+              <a:rPr lang="en-US" dirty="0"/>
+              <a:t>Eliminates type errors (which are super common in JavaScript)</a:t>
+            </a:r>
+          </a:p>
+          <a:p>
+            <a:pPr lvl="1"/>
+            <a:r>
+              <a:rPr lang="en-US" dirty="0"/>
+              <a:t>Allow large projects</a:t>
+            </a:r>
+          </a:p>
+          <a:p>
+            <a:pPr lvl="1"/>
+            <a:r>
+              <a:rPr lang="en-US" dirty="0"/>
+              <a:t>Allow large teams</a:t>
+            </a:r>
+          </a:p>
+          <a:p>
+            <a:pPr lvl="1"/>
+            <a:r>
+              <a:rPr lang="en-US" dirty="0"/>
+              <a:t>Reduces need for type documentation</a:t>
+            </a:r>
+          </a:p>
+          <a:p>
+            <a:pPr lvl="1"/>
+            <a:r>
+              <a:rPr lang="en-US" dirty="0"/>
+              <a:t>Reduces need for cross developer communication</a:t>
+            </a:r>
+          </a:p>
+          <a:p>
+            <a:pPr lvl="1"/>
+            <a:r>
+              <a:rPr lang="en-US" dirty="0"/>
+              <a:t>The flexibility of JavaScript with type safety</a:t>
+            </a:r>
+          </a:p>
+          <a:p>
+            <a:pPr lvl="1"/>
+            <a:r>
+              <a:rPr lang="en-US" dirty="0"/>
+              <a:t>Freedom to target specific ECMAScript versions</a:t>
+            </a:r>
+          </a:p>
+          <a:p>
+            <a:pPr lvl="2"/>
+            <a:r>
+              <a:rPr lang="en-US" dirty="0"/>
+              <a:t>ES3 / ES5 / ES6 / ES2016 (ES7)</a:t>
+            </a:r>
+          </a:p>
+          <a:p>
+            <a:pPr lvl="1"/>
+            <a:r>
+              <a:rPr lang="en-US" dirty="0"/>
+              <a:t>Freedom to target specific module systems</a:t>
+            </a:r>
+          </a:p>
+          <a:p>
+            <a:pPr lvl="2"/>
+            <a:r>
+              <a:rPr lang="en-US" dirty="0" err="1"/>
+              <a:t>CommonJS</a:t>
+            </a:r>
+            <a:r>
+              <a:rPr lang="en-US" dirty="0"/>
+              <a:t> / AMD / UMD / </a:t>
+            </a:r>
+            <a:r>
+              <a:rPr lang="en-US" dirty="0" err="1"/>
+              <a:t>ect</a:t>
+            </a:r>
+            <a:r>
+              <a:rPr lang="en-US" dirty="0"/>
+              <a:t>…</a:t>
+            </a:r>
+          </a:p>
+          <a:p>
+            <a:pPr lvl="1"/>
+            <a:endParaRPr lang="en-US" dirty="0"/>
+          </a:p>
+        </p:txBody>
+      </p:sp>
+      <p:pic>
+        <p:nvPicPr>
+          <p:cNvPr id="1028" name="Picture 4" descr="https://upload.wikimedia.org/wikipedia/commons/a/a6/TypeScript_Logo.png"/>
+          <p:cNvPicPr>
+            <a:picLocks noChangeAspect="1" noChangeArrowheads="1"/>
+          </p:cNvPicPr>
+          <p:nvPr/>
+        </p:nvPicPr>
+        <p:blipFill>
+          <a:blip r:embed="rId2">
+            <a:extLst>
+              <a:ext uri="{28A0092B-C50C-407E-A947-70E740481C1C}">
+                <a14:useLocalDpi xmlns:a14="http://schemas.microsoft.com/office/drawing/2010/main" val="0"/>
+              </a:ext>
+            </a:extLst>
+          </a:blip>
+          <a:srcRect/>
+          <a:stretch>
+            <a:fillRect/>
+          </a:stretch>
+        </p:blipFill>
+        <p:spPr bwMode="auto">
+          <a:xfrm>
+            <a:off x="2998426" y="1119758"/>
+            <a:ext cx="2381250" cy="581026"/>
+          </a:xfrm>
+          <a:prstGeom prst="rect">
+            <a:avLst/>
+          </a:prstGeom>
+          <a:noFill/>
+          <a:extLst>
+            <a:ext uri="{909E8E84-426E-40DD-AFC4-6F175D3DCCD1}">
+              <a14:hiddenFill xmlns:a14="http://schemas.microsoft.com/office/drawing/2010/main">
                 <a:solidFill>
-                  <a:schemeClr val="accent1"/>
+                  <a:srgbClr val="FFFFFF"/>
                 </a:solidFill>
-                <a:latin typeface="Consolas" panose="020B0609020204030204" pitchFamily="49" charset="0"/>
-              </a:rPr>
-              <a:t>IF </a:t>
-            </a:r>
-            <a:r>
-              <a:rPr lang="en-US" sz="2800" b="1" u="sng" dirty="0">
-                <a:solidFill>
-                  <a:schemeClr val="accent1"/>
-                </a:solidFill>
-                <a:latin typeface="Consolas" panose="020B0609020204030204" pitchFamily="49" charset="0"/>
-              </a:rPr>
-              <a:t>NOT</a:t>
-            </a:r>
-            <a:r>
-              <a:rPr lang="en-US" sz="2400" dirty="0">
-                <a:solidFill>
-                  <a:schemeClr val="accent1"/>
-                </a:solidFill>
-                <a:latin typeface="Consolas" panose="020B0609020204030204" pitchFamily="49" charset="0"/>
-              </a:rPr>
-              <a:t> USING VSCODE, USE THIS TO RUN CODE:</a:t>
-            </a:r>
-          </a:p>
-          <a:p>
-            <a:pPr marL="45720" indent="0">
-              <a:buNone/>
-            </a:pPr>
-            <a:r>
-              <a:rPr lang="en-US" sz="2400" dirty="0">
-                <a:latin typeface="Consolas" panose="020B0609020204030204" pitchFamily="49" charset="0"/>
-              </a:rPr>
-              <a:t>node bin/main.js</a:t>
-            </a:r>
-          </a:p>
-          <a:p>
-            <a:pPr marL="45720" indent="0">
-              <a:buNone/>
-            </a:pPr>
-            <a:endParaRPr lang="en-US" sz="2400" dirty="0">
-              <a:latin typeface="Consolas" panose="020B0609020204030204" pitchFamily="49" charset="0"/>
-            </a:endParaRPr>
-          </a:p>
-          <a:p>
-            <a:pPr marL="45720" indent="0">
-              <a:buNone/>
-            </a:pPr>
-            <a:endParaRPr lang="en-US" dirty="0">
-              <a:latin typeface="Consolas" panose="020B0609020204030204" pitchFamily="49" charset="0"/>
-            </a:endParaRPr>
-          </a:p>
-        </p:txBody>
-      </p:sp>
+              </a14:hiddenFill>
+            </a:ext>
+          </a:extLst>
+        </p:spPr>
+      </p:pic>
     </p:spTree>
     <p:extLst>
       <p:ext uri="{BB962C8B-B14F-4D97-AF65-F5344CB8AC3E}">
-        <p14:creationId xmlns:p14="http://schemas.microsoft.com/office/powerpoint/2010/main" val="1596373389"/>
+        <p14:creationId xmlns:p14="http://schemas.microsoft.com/office/powerpoint/2010/main" val="601310991"/>
       </p:ext>
     </p:extLst>
   </p:cSld>

</xml_diff>